<commit_message>
Lecture in progress, added burndown chart example
</commit_message>
<xml_diff>
--- a/GAM240/03/19-20-GAM240-Lecture-Planning.pptx
+++ b/GAM240/03/19-20-GAM240-Lecture-Planning.pptx
@@ -5,14 +5,25 @@
     <p:sldMasterId id="2147483648" r:id="rId1"/>
   </p:sldMasterIdLst>
   <p:notesMasterIdLst>
-    <p:notesMasterId r:id="rId7"/>
+    <p:notesMasterId r:id="rId18"/>
   </p:notesMasterIdLst>
   <p:sldIdLst>
     <p:sldId id="419" r:id="rId2"/>
     <p:sldId id="445" r:id="rId3"/>
     <p:sldId id="427" r:id="rId4"/>
-    <p:sldId id="446" r:id="rId5"/>
-    <p:sldId id="432" r:id="rId6"/>
+    <p:sldId id="454" r:id="rId5"/>
+    <p:sldId id="453" r:id="rId6"/>
+    <p:sldId id="447" r:id="rId7"/>
+    <p:sldId id="448" r:id="rId8"/>
+    <p:sldId id="449" r:id="rId9"/>
+    <p:sldId id="450" r:id="rId10"/>
+    <p:sldId id="452" r:id="rId11"/>
+    <p:sldId id="451" r:id="rId12"/>
+    <p:sldId id="455" r:id="rId13"/>
+    <p:sldId id="457" r:id="rId14"/>
+    <p:sldId id="456" r:id="rId15"/>
+    <p:sldId id="458" r:id="rId16"/>
+    <p:sldId id="432" r:id="rId17"/>
   </p:sldIdLst>
   <p:sldSz cx="12192000" cy="6858000"/>
   <p:notesSz cx="6858000" cy="9144000"/>
@@ -1399,6 +1410,22 @@
     </pc:docChg>
   </pc:docChgLst>
   <pc:docChgLst>
+    <pc:chgData name="Brown, Douglas" userId="S::douglas.brown@falmouth.ac.uk::b94bef97-b03b-4b9e-b7d6-1af096615b03" providerId="AD" clId="Web-{AFC4A9D2-045C-518D-7436-06A25367AEF9}"/>
+    <pc:docChg chg="addSld">
+      <pc:chgData name="Brown, Douglas" userId="S::douglas.brown@falmouth.ac.uk::b94bef97-b03b-4b9e-b7d6-1af096615b03" providerId="AD" clId="Web-{AFC4A9D2-045C-518D-7436-06A25367AEF9}" dt="2019-09-15T22:35:02.014" v="1"/>
+      <pc:docMkLst>
+        <pc:docMk/>
+      </pc:docMkLst>
+      <pc:sldChg chg="add replId">
+        <pc:chgData name="Brown, Douglas" userId="S::douglas.brown@falmouth.ac.uk::b94bef97-b03b-4b9e-b7d6-1af096615b03" providerId="AD" clId="Web-{AFC4A9D2-045C-518D-7436-06A25367AEF9}" dt="2019-09-15T22:35:02.014" v="1"/>
+        <pc:sldMkLst>
+          <pc:docMk/>
+          <pc:sldMk cId="477391072" sldId="407"/>
+        </pc:sldMkLst>
+      </pc:sldChg>
+    </pc:docChg>
+  </pc:docChgLst>
+  <pc:docChgLst>
     <pc:chgData name="McDonald, Brian" userId="3e006e5c-7f43-4fe5-81fe-fb9aab0b0630" providerId="ADAL" clId="{50098540-3C57-A44D-876F-1816EAFCB0C3}"/>
     <pc:docChg chg="undo custSel addSld delSld modSld sldOrd modMainMaster">
       <pc:chgData name="McDonald, Brian" userId="3e006e5c-7f43-4fe5-81fe-fb9aab0b0630" providerId="ADAL" clId="{50098540-3C57-A44D-876F-1816EAFCB0C3}" dt="2019-09-18T08:40:22.749" v="834" actId="1076"/>
@@ -1576,22 +1603,6 @@
           </pc:sldLayoutMkLst>
         </pc:sldLayoutChg>
       </pc:sldMasterChg>
-    </pc:docChg>
-  </pc:docChgLst>
-  <pc:docChgLst>
-    <pc:chgData name="Brown, Douglas" userId="S::douglas.brown@falmouth.ac.uk::b94bef97-b03b-4b9e-b7d6-1af096615b03" providerId="AD" clId="Web-{AFC4A9D2-045C-518D-7436-06A25367AEF9}"/>
-    <pc:docChg chg="addSld">
-      <pc:chgData name="Brown, Douglas" userId="S::douglas.brown@falmouth.ac.uk::b94bef97-b03b-4b9e-b7d6-1af096615b03" providerId="AD" clId="Web-{AFC4A9D2-045C-518D-7436-06A25367AEF9}" dt="2019-09-15T22:35:02.014" v="1"/>
-      <pc:docMkLst>
-        <pc:docMk/>
-      </pc:docMkLst>
-      <pc:sldChg chg="add replId">
-        <pc:chgData name="Brown, Douglas" userId="S::douglas.brown@falmouth.ac.uk::b94bef97-b03b-4b9e-b7d6-1af096615b03" providerId="AD" clId="Web-{AFC4A9D2-045C-518D-7436-06A25367AEF9}" dt="2019-09-15T22:35:02.014" v="1"/>
-        <pc:sldMkLst>
-          <pc:docMk/>
-          <pc:sldMk cId="477391072" sldId="407"/>
-        </pc:sldMkLst>
-      </pc:sldChg>
     </pc:docChg>
   </pc:docChgLst>
   <pc:docChgLst>
@@ -1637,15 +1648,6 @@
     </pc:docChg>
   </pc:docChgLst>
   <pc:docChgLst>
-    <pc:chgData name="Brown, Douglas" userId="S::douglas.brown@falmouth.ac.uk::b94bef97-b03b-4b9e-b7d6-1af096615b03" providerId="AD" clId="Web-{CF53D88A-7E32-4FC6-B6FC-9A5F8086411F}"/>
-    <pc:docChg chg="addSld delSld modSld sldOrd">
-      <pc:chgData name="Brown, Douglas" userId="S::douglas.brown@falmouth.ac.uk::b94bef97-b03b-4b9e-b7d6-1af096615b03" providerId="AD" clId="Web-{CF53D88A-7E32-4FC6-B6FC-9A5F8086411F}" dt="2019-09-15T22:14:21.517" v="546"/>
-      <pc:docMkLst>
-        <pc:docMk/>
-      </pc:docMkLst>
-    </pc:docChg>
-  </pc:docChgLst>
-  <pc:docChgLst>
     <pc:chgData name="McDonald, Brian" userId="S::brian.mcdonald@falmouth.ac.uk::3e006e5c-7f43-4fe5-81fe-fb9aab0b0630" providerId="AD" clId="Web-{B69BC4D8-B50B-4C12-A5CD-767784BD8E30}"/>
     <pc:docChg chg="addSld delSld modSld">
       <pc:chgData name="McDonald, Brian" userId="S::brian.mcdonald@falmouth.ac.uk::3e006e5c-7f43-4fe5-81fe-fb9aab0b0630" providerId="AD" clId="Web-{B69BC4D8-B50B-4C12-A5CD-767784BD8E30}" dt="2019-09-26T07:12:29.073" v="5"/>
@@ -1698,6 +1700,15 @@
           </ac:picMkLst>
         </pc:picChg>
       </pc:sldChg>
+    </pc:docChg>
+  </pc:docChgLst>
+  <pc:docChgLst>
+    <pc:chgData name="Brown, Douglas" userId="S::douglas.brown@falmouth.ac.uk::b94bef97-b03b-4b9e-b7d6-1af096615b03" providerId="AD" clId="Web-{CF53D88A-7E32-4FC6-B6FC-9A5F8086411F}"/>
+    <pc:docChg chg="addSld delSld modSld sldOrd">
+      <pc:chgData name="Brown, Douglas" userId="S::douglas.brown@falmouth.ac.uk::b94bef97-b03b-4b9e-b7d6-1af096615b03" providerId="AD" clId="Web-{CF53D88A-7E32-4FC6-B6FC-9A5F8086411F}" dt="2019-09-15T22:14:21.517" v="546"/>
+      <pc:docMkLst>
+        <pc:docMk/>
+      </pc:docMkLst>
     </pc:docChg>
   </pc:docChgLst>
   <pc:docChgLst>
@@ -5356,7 +5367,7 @@
 </p:sld>
 </file>
 
-<file path=ppt/slides/slide2.xml><?xml version="1.0" encoding="utf-8"?>
+<file path=ppt/slides/slide10.xml><?xml version="1.0" encoding="utf-8"?>
 <p:sld xmlns:a="http://schemas.openxmlformats.org/drawingml/2006/main" xmlns:r="http://schemas.openxmlformats.org/officeDocument/2006/relationships" xmlns:p="http://schemas.openxmlformats.org/presentationml/2006/main">
   <p:cSld>
     <p:bg>
@@ -5594,7 +5605,7 @@
         <p:spPr>
           <a:xfrm>
             <a:off x="1377680" y="2676135"/>
-            <a:ext cx="9741439" cy="2200602"/>
+            <a:ext cx="9741439" cy="1277273"/>
           </a:xfrm>
           <a:prstGeom prst="rect">
             <a:avLst/>
@@ -5613,6 +5624,1141 @@
                   <a:schemeClr val="bg1"/>
                 </a:solidFill>
               </a:rPr>
+              <a:t>Planning</a:t>
+            </a:r>
+            <a:endParaRPr lang="en-US" sz="6000" dirty="0">
+              <a:solidFill>
+                <a:schemeClr val="bg1"/>
+              </a:solidFill>
+            </a:endParaRPr>
+          </a:p>
+        </p:txBody>
+      </p:sp>
+      <p:sp>
+        <p:nvSpPr>
+          <p:cNvPr id="3" name="AutoShape 2" descr="https://falmouthac.sharepoint.com/teams/games/GameDev/Image%20Bank/2017%2001%2017%20Programmers%20Guild%20Workshop/WP_20170117_11_55_41_Pro.jpg">
+            <a:extLst>
+              <a:ext uri="{FF2B5EF4-FFF2-40B4-BE49-F238E27FC236}">
+                <a16:creationId xmlns:a16="http://schemas.microsoft.com/office/drawing/2014/main" id="{7F32BB6C-44F2-4A5C-81D5-45F5683591FD}"/>
+              </a:ext>
+            </a:extLst>
+          </p:cNvPr>
+          <p:cNvSpPr>
+            <a:spLocks noChangeAspect="1" noChangeArrowheads="1"/>
+          </p:cNvSpPr>
+          <p:nvPr/>
+        </p:nvSpPr>
+        <p:spPr bwMode="auto">
+          <a:xfrm>
+            <a:off x="5943600" y="3276600"/>
+            <a:ext cx="304800" cy="304800"/>
+          </a:xfrm>
+          <a:prstGeom prst="rect">
+            <a:avLst/>
+          </a:prstGeom>
+          <a:noFill/>
+          <a:extLst>
+            <a:ext uri="{909E8E84-426E-40DD-AFC4-6F175D3DCCD1}">
+              <a14:hiddenFill xmlns:a14="http://schemas.microsoft.com/office/drawing/2010/main">
+                <a:solidFill>
+                  <a:srgbClr val="FFFFFF"/>
+                </a:solidFill>
+              </a14:hiddenFill>
+            </a:ext>
+          </a:extLst>
+        </p:spPr>
+        <p:txBody>
+          <a:bodyPr vert="horz" wrap="square" lIns="91440" tIns="45720" rIns="91440" bIns="45720" numCol="1" anchor="t" anchorCtr="0" compatLnSpc="1">
+            <a:prstTxWarp prst="textNoShape">
+              <a:avLst/>
+            </a:prstTxWarp>
+          </a:bodyPr>
+          <a:lstStyle/>
+          <a:p>
+            <a:endParaRPr lang="en-GB"/>
+          </a:p>
+        </p:txBody>
+      </p:sp>
+    </p:spTree>
+    <p:extLst>
+      <p:ext uri="{BB962C8B-B14F-4D97-AF65-F5344CB8AC3E}">
+        <p14:creationId xmlns:p14="http://schemas.microsoft.com/office/powerpoint/2010/main" val="1756232443"/>
+      </p:ext>
+    </p:extLst>
+  </p:cSld>
+  <p:clrMapOvr>
+    <a:masterClrMapping/>
+  </p:clrMapOvr>
+</p:sld>
+</file>
+
+<file path=ppt/slides/slide11.xml><?xml version="1.0" encoding="utf-8"?>
+<p:sld xmlns:a="http://schemas.openxmlformats.org/drawingml/2006/main" xmlns:r="http://schemas.openxmlformats.org/officeDocument/2006/relationships" xmlns:p="http://schemas.openxmlformats.org/presentationml/2006/main">
+  <p:cSld>
+    <p:spTree>
+      <p:nvGrpSpPr>
+        <p:cNvPr id="1" name=""/>
+        <p:cNvGrpSpPr/>
+        <p:nvPr/>
+      </p:nvGrpSpPr>
+      <p:grpSpPr>
+        <a:xfrm>
+          <a:off x="0" y="0"/>
+          <a:ext cx="0" cy="0"/>
+          <a:chOff x="0" y="0"/>
+          <a:chExt cx="0" cy="0"/>
+        </a:xfrm>
+      </p:grpSpPr>
+      <p:sp>
+        <p:nvSpPr>
+          <p:cNvPr id="3" name="Text Placeholder 2">
+            <a:extLst>
+              <a:ext uri="{FF2B5EF4-FFF2-40B4-BE49-F238E27FC236}">
+                <a16:creationId xmlns:a16="http://schemas.microsoft.com/office/drawing/2014/main" id="{6E3909CC-9819-6445-A908-8CD6E18821C6}"/>
+              </a:ext>
+            </a:extLst>
+          </p:cNvPr>
+          <p:cNvSpPr>
+            <a:spLocks noGrp="1"/>
+          </p:cNvSpPr>
+          <p:nvPr>
+            <p:ph type="body" sz="quarter" idx="14"/>
+          </p:nvPr>
+        </p:nvSpPr>
+        <p:spPr>
+          <a:xfrm>
+            <a:off x="954303" y="1193058"/>
+            <a:ext cx="10363054" cy="4306594"/>
+          </a:xfrm>
+        </p:spPr>
+        <p:txBody>
+          <a:bodyPr>
+            <a:normAutofit lnSpcReduction="10000"/>
+          </a:bodyPr>
+          <a:lstStyle/>
+          <a:p>
+            <a:pPr marL="457200" indent="-457200">
+              <a:buFont typeface="Arial" panose="020B0604020202020204" pitchFamily="34" charset="0"/>
+              <a:buChar char="•"/>
+            </a:pPr>
+            <a:endParaRPr lang="en-US" dirty="0"/>
+          </a:p>
+          <a:p>
+            <a:pPr marL="457200" indent="-457200">
+              <a:buFont typeface="Arial" panose="020B0604020202020204" pitchFamily="34" charset="0"/>
+              <a:buChar char="•"/>
+            </a:pPr>
+            <a:r>
+              <a:rPr lang="en-US" dirty="0"/>
+              <a:t>We as developers always want to get our best work into the game</a:t>
+            </a:r>
+          </a:p>
+          <a:p>
+            <a:pPr marL="1143000" lvl="1" indent="-457200"/>
+            <a:r>
+              <a:rPr lang="en-US" dirty="0"/>
+              <a:t>Be it the Programmer who wants to make the best engineered system</a:t>
+            </a:r>
+          </a:p>
+          <a:p>
+            <a:pPr marL="1143000" lvl="1" indent="-457200"/>
+            <a:r>
+              <a:rPr lang="en-US" dirty="0"/>
+              <a:t>Or the Artist who wants to make the perfect piece</a:t>
+            </a:r>
+          </a:p>
+          <a:p>
+            <a:pPr marL="457200" indent="-457200">
+              <a:buFont typeface="Arial" panose="020B0604020202020204" pitchFamily="34" charset="0"/>
+              <a:buChar char="•"/>
+            </a:pPr>
+            <a:r>
+              <a:rPr lang="en-US" dirty="0"/>
+              <a:t>Have your team estimate how long a task with take, say 2 hours</a:t>
+            </a:r>
+          </a:p>
+          <a:p>
+            <a:pPr marL="457200" indent="-457200">
+              <a:buFont typeface="Arial" panose="020B0604020202020204" pitchFamily="34" charset="0"/>
+              <a:buChar char="•"/>
+            </a:pPr>
+            <a:r>
+              <a:rPr lang="en-US" dirty="0"/>
+              <a:t>Add 10-20%, now around 3 hours</a:t>
+            </a:r>
+          </a:p>
+          <a:p>
+            <a:pPr marL="457200" indent="-457200">
+              <a:buFont typeface="Arial" panose="020B0604020202020204" pitchFamily="34" charset="0"/>
+              <a:buChar char="•"/>
+            </a:pPr>
+            <a:r>
+              <a:rPr lang="en-US" dirty="0"/>
+              <a:t>Say that they that much time to work on the task</a:t>
+            </a:r>
+          </a:p>
+          <a:p>
+            <a:pPr marL="457200" indent="-457200">
+              <a:buFont typeface="Arial" panose="020B0604020202020204" pitchFamily="34" charset="0"/>
+              <a:buChar char="•"/>
+            </a:pPr>
+            <a:r>
+              <a:rPr lang="en-US" dirty="0"/>
+              <a:t>However they can come back and iterate in later sprints</a:t>
+            </a:r>
+          </a:p>
+        </p:txBody>
+      </p:sp>
+      <p:sp>
+        <p:nvSpPr>
+          <p:cNvPr id="4" name="Text Placeholder 3">
+            <a:extLst>
+              <a:ext uri="{FF2B5EF4-FFF2-40B4-BE49-F238E27FC236}">
+                <a16:creationId xmlns:a16="http://schemas.microsoft.com/office/drawing/2014/main" id="{D1E798D3-E27F-F349-ADFD-6A2DD1E30093}"/>
+              </a:ext>
+            </a:extLst>
+          </p:cNvPr>
+          <p:cNvSpPr>
+            <a:spLocks noGrp="1"/>
+          </p:cNvSpPr>
+          <p:nvPr>
+            <p:ph type="body" sz="quarter" idx="16"/>
+          </p:nvPr>
+        </p:nvSpPr>
+        <p:spPr>
+          <a:xfrm>
+            <a:off x="954303" y="362445"/>
+            <a:ext cx="8038996" cy="631961"/>
+          </a:xfrm>
+        </p:spPr>
+        <p:txBody>
+          <a:bodyPr/>
+          <a:lstStyle/>
+          <a:p>
+            <a:r>
+              <a:rPr lang="en-US" dirty="0"/>
+              <a:t>TIME Boxing</a:t>
+            </a:r>
+          </a:p>
+        </p:txBody>
+      </p:sp>
+    </p:spTree>
+    <p:extLst>
+      <p:ext uri="{BB962C8B-B14F-4D97-AF65-F5344CB8AC3E}">
+        <p14:creationId xmlns:p14="http://schemas.microsoft.com/office/powerpoint/2010/main" val="3501595035"/>
+      </p:ext>
+    </p:extLst>
+  </p:cSld>
+  <p:clrMapOvr>
+    <a:masterClrMapping/>
+  </p:clrMapOvr>
+</p:sld>
+</file>
+
+<file path=ppt/slides/slide12.xml><?xml version="1.0" encoding="utf-8"?>
+<p:sld xmlns:a="http://schemas.openxmlformats.org/drawingml/2006/main" xmlns:r="http://schemas.openxmlformats.org/officeDocument/2006/relationships" xmlns:p="http://schemas.openxmlformats.org/presentationml/2006/main">
+  <p:cSld>
+    <p:spTree>
+      <p:nvGrpSpPr>
+        <p:cNvPr id="1" name=""/>
+        <p:cNvGrpSpPr/>
+        <p:nvPr/>
+      </p:nvGrpSpPr>
+      <p:grpSpPr>
+        <a:xfrm>
+          <a:off x="0" y="0"/>
+          <a:ext cx="0" cy="0"/>
+          <a:chOff x="0" y="0"/>
+          <a:chExt cx="0" cy="0"/>
+        </a:xfrm>
+      </p:grpSpPr>
+      <p:sp>
+        <p:nvSpPr>
+          <p:cNvPr id="3" name="Text Placeholder 2">
+            <a:extLst>
+              <a:ext uri="{FF2B5EF4-FFF2-40B4-BE49-F238E27FC236}">
+                <a16:creationId xmlns:a16="http://schemas.microsoft.com/office/drawing/2014/main" id="{6E3909CC-9819-6445-A908-8CD6E18821C6}"/>
+              </a:ext>
+            </a:extLst>
+          </p:cNvPr>
+          <p:cNvSpPr>
+            <a:spLocks noGrp="1"/>
+          </p:cNvSpPr>
+          <p:nvPr>
+            <p:ph type="body" sz="quarter" idx="14"/>
+          </p:nvPr>
+        </p:nvSpPr>
+        <p:spPr>
+          <a:xfrm>
+            <a:off x="954303" y="1193058"/>
+            <a:ext cx="10363054" cy="4306594"/>
+          </a:xfrm>
+        </p:spPr>
+        <p:txBody>
+          <a:bodyPr>
+            <a:normAutofit fontScale="92500" lnSpcReduction="20000"/>
+          </a:bodyPr>
+          <a:lstStyle/>
+          <a:p>
+            <a:pPr marL="457200" indent="-457200">
+              <a:buFont typeface="Arial" panose="020B0604020202020204" pitchFamily="34" charset="0"/>
+              <a:buChar char="•"/>
+            </a:pPr>
+            <a:endParaRPr lang="en-US" dirty="0"/>
+          </a:p>
+          <a:p>
+            <a:pPr marL="457200" indent="-457200">
+              <a:buFont typeface="Arial" panose="020B0604020202020204" pitchFamily="34" charset="0"/>
+              <a:buChar char="•"/>
+            </a:pPr>
+            <a:r>
+              <a:rPr lang="en-US" dirty="0"/>
+              <a:t>This is a graphical representation of the work left to do vs time</a:t>
+            </a:r>
+          </a:p>
+          <a:p>
+            <a:pPr marL="1143000" lvl="1" indent="-457200"/>
+            <a:r>
+              <a:rPr lang="en-US" dirty="0"/>
+              <a:t>X-axis is the project/iteration timeline</a:t>
+            </a:r>
+          </a:p>
+          <a:p>
+            <a:pPr marL="1143000" lvl="1" indent="-457200"/>
+            <a:r>
+              <a:rPr lang="en-US" dirty="0"/>
+              <a:t>Y-axis is the estimated sum of the work that needs to be completed</a:t>
+            </a:r>
+          </a:p>
+          <a:p>
+            <a:pPr marL="1143000" lvl="1" indent="-457200"/>
+            <a:r>
+              <a:rPr lang="en-US" dirty="0"/>
+              <a:t>There is an </a:t>
+            </a:r>
+            <a:r>
+              <a:rPr lang="en-US" b="1" dirty="0"/>
+              <a:t>ideal working line</a:t>
+            </a:r>
+            <a:r>
+              <a:rPr lang="en-US" dirty="0"/>
+              <a:t>, which connects the start point (0 on the x-axis &amp; total sum of work on y-axis)</a:t>
+            </a:r>
+          </a:p>
+          <a:p>
+            <a:pPr marL="457200" indent="-457200">
+              <a:buFont typeface="Arial" panose="020B0604020202020204" pitchFamily="34" charset="0"/>
+              <a:buChar char="•"/>
+            </a:pPr>
+            <a:r>
+              <a:rPr lang="en-US" dirty="0"/>
+              <a:t>As task are carried out, you update the graph, this gives you an </a:t>
+            </a:r>
+            <a:r>
+              <a:rPr lang="en-US" b="1" dirty="0"/>
+              <a:t>actual work remaining line</a:t>
+            </a:r>
+            <a:endParaRPr lang="en-US" dirty="0"/>
+          </a:p>
+          <a:p>
+            <a:pPr marL="457200" indent="-457200">
+              <a:buFont typeface="Arial" panose="020B0604020202020204" pitchFamily="34" charset="0"/>
+              <a:buChar char="•"/>
+            </a:pPr>
+            <a:r>
+              <a:rPr lang="en-US" dirty="0"/>
+              <a:t>If the actual work remaining line is </a:t>
+            </a:r>
+            <a:r>
+              <a:rPr lang="en-US" b="1" dirty="0"/>
+              <a:t>above</a:t>
+            </a:r>
+            <a:r>
+              <a:rPr lang="en-US" dirty="0"/>
+              <a:t> the ideal working line, then the project is </a:t>
+            </a:r>
+            <a:r>
+              <a:rPr lang="en-US" b="1" dirty="0"/>
+              <a:t>behind</a:t>
+            </a:r>
+            <a:r>
+              <a:rPr lang="en-US" dirty="0"/>
+              <a:t> schedule</a:t>
+            </a:r>
+          </a:p>
+          <a:p>
+            <a:pPr marL="457200" indent="-457200">
+              <a:buFont typeface="Arial" panose="020B0604020202020204" pitchFamily="34" charset="0"/>
+              <a:buChar char="•"/>
+            </a:pPr>
+            <a:r>
+              <a:rPr lang="en-US" dirty="0"/>
+              <a:t>If the actual work remaining line is </a:t>
+            </a:r>
+            <a:r>
+              <a:rPr lang="en-US" b="1" dirty="0"/>
+              <a:t>Below</a:t>
+            </a:r>
+            <a:r>
+              <a:rPr lang="en-US" dirty="0"/>
+              <a:t> the ideal working link, then the project is </a:t>
+            </a:r>
+            <a:r>
+              <a:rPr lang="en-US" b="1" dirty="0"/>
+              <a:t>ahead</a:t>
+            </a:r>
+            <a:r>
+              <a:rPr lang="en-US" dirty="0"/>
+              <a:t> of schedule</a:t>
+            </a:r>
+          </a:p>
+        </p:txBody>
+      </p:sp>
+      <p:sp>
+        <p:nvSpPr>
+          <p:cNvPr id="4" name="Text Placeholder 3">
+            <a:extLst>
+              <a:ext uri="{FF2B5EF4-FFF2-40B4-BE49-F238E27FC236}">
+                <a16:creationId xmlns:a16="http://schemas.microsoft.com/office/drawing/2014/main" id="{D1E798D3-E27F-F349-ADFD-6A2DD1E30093}"/>
+              </a:ext>
+            </a:extLst>
+          </p:cNvPr>
+          <p:cNvSpPr>
+            <a:spLocks noGrp="1"/>
+          </p:cNvSpPr>
+          <p:nvPr>
+            <p:ph type="body" sz="quarter" idx="16"/>
+          </p:nvPr>
+        </p:nvSpPr>
+        <p:spPr>
+          <a:xfrm>
+            <a:off x="954303" y="362445"/>
+            <a:ext cx="8038996" cy="631961"/>
+          </a:xfrm>
+        </p:spPr>
+        <p:txBody>
+          <a:bodyPr/>
+          <a:lstStyle/>
+          <a:p>
+            <a:r>
+              <a:rPr lang="en-US" dirty="0"/>
+              <a:t>Burndown charts</a:t>
+            </a:r>
+          </a:p>
+        </p:txBody>
+      </p:sp>
+    </p:spTree>
+    <p:extLst>
+      <p:ext uri="{BB962C8B-B14F-4D97-AF65-F5344CB8AC3E}">
+        <p14:creationId xmlns:p14="http://schemas.microsoft.com/office/powerpoint/2010/main" val="2836255060"/>
+      </p:ext>
+    </p:extLst>
+  </p:cSld>
+  <p:clrMapOvr>
+    <a:masterClrMapping/>
+  </p:clrMapOvr>
+</p:sld>
+</file>
+
+<file path=ppt/slides/slide13.xml><?xml version="1.0" encoding="utf-8"?>
+<p:sld xmlns:a="http://schemas.openxmlformats.org/drawingml/2006/main" xmlns:r="http://schemas.openxmlformats.org/officeDocument/2006/relationships" xmlns:p="http://schemas.openxmlformats.org/presentationml/2006/main">
+  <p:cSld>
+    <p:spTree>
+      <p:nvGrpSpPr>
+        <p:cNvPr id="1" name=""/>
+        <p:cNvGrpSpPr/>
+        <p:nvPr/>
+      </p:nvGrpSpPr>
+      <p:grpSpPr>
+        <a:xfrm>
+          <a:off x="0" y="0"/>
+          <a:ext cx="0" cy="0"/>
+          <a:chOff x="0" y="0"/>
+          <a:chExt cx="0" cy="0"/>
+        </a:xfrm>
+      </p:grpSpPr>
+      <p:sp>
+        <p:nvSpPr>
+          <p:cNvPr id="4" name="Text Placeholder 3">
+            <a:extLst>
+              <a:ext uri="{FF2B5EF4-FFF2-40B4-BE49-F238E27FC236}">
+                <a16:creationId xmlns:a16="http://schemas.microsoft.com/office/drawing/2014/main" id="{D1E798D3-E27F-F349-ADFD-6A2DD1E30093}"/>
+              </a:ext>
+            </a:extLst>
+          </p:cNvPr>
+          <p:cNvSpPr>
+            <a:spLocks noGrp="1"/>
+          </p:cNvSpPr>
+          <p:nvPr>
+            <p:ph type="body" sz="quarter" idx="16"/>
+          </p:nvPr>
+        </p:nvSpPr>
+        <p:spPr>
+          <a:xfrm>
+            <a:off x="954303" y="362445"/>
+            <a:ext cx="8038996" cy="631961"/>
+          </a:xfrm>
+        </p:spPr>
+        <p:txBody>
+          <a:bodyPr/>
+          <a:lstStyle/>
+          <a:p>
+            <a:r>
+              <a:rPr lang="en-US" dirty="0"/>
+              <a:t>Burndown charts</a:t>
+            </a:r>
+          </a:p>
+        </p:txBody>
+      </p:sp>
+      <p:pic>
+        <p:nvPicPr>
+          <p:cNvPr id="5" name="Picture 4" descr="Image result for burndown chart">
+            <a:extLst>
+              <a:ext uri="{FF2B5EF4-FFF2-40B4-BE49-F238E27FC236}">
+                <a16:creationId xmlns:a16="http://schemas.microsoft.com/office/drawing/2014/main" id="{74F615FF-7012-41F9-9DD5-055888A0657B}"/>
+              </a:ext>
+            </a:extLst>
+          </p:cNvPr>
+          <p:cNvPicPr>
+            <a:picLocks noChangeAspect="1" noChangeArrowheads="1"/>
+          </p:cNvPicPr>
+          <p:nvPr/>
+        </p:nvPicPr>
+        <p:blipFill>
+          <a:blip r:embed="rId2">
+            <a:extLst>
+              <a:ext uri="{28A0092B-C50C-407E-A947-70E740481C1C}">
+                <a14:useLocalDpi xmlns:a14="http://schemas.microsoft.com/office/drawing/2010/main" val="0"/>
+              </a:ext>
+            </a:extLst>
+          </a:blip>
+          <a:srcRect/>
+          <a:stretch>
+            <a:fillRect/>
+          </a:stretch>
+        </p:blipFill>
+        <p:spPr bwMode="auto">
+          <a:xfrm>
+            <a:off x="3076575" y="1856675"/>
+            <a:ext cx="6038850" cy="3295650"/>
+          </a:xfrm>
+          <a:prstGeom prst="rect">
+            <a:avLst/>
+          </a:prstGeom>
+          <a:noFill/>
+          <a:extLst>
+            <a:ext uri="{909E8E84-426E-40DD-AFC4-6F175D3DCCD1}">
+              <a14:hiddenFill xmlns:a14="http://schemas.microsoft.com/office/drawing/2010/main">
+                <a:solidFill>
+                  <a:srgbClr val="FFFFFF"/>
+                </a:solidFill>
+              </a14:hiddenFill>
+            </a:ext>
+          </a:extLst>
+        </p:spPr>
+      </p:pic>
+    </p:spTree>
+    <p:extLst>
+      <p:ext uri="{BB962C8B-B14F-4D97-AF65-F5344CB8AC3E}">
+        <p14:creationId xmlns:p14="http://schemas.microsoft.com/office/powerpoint/2010/main" val="3746960811"/>
+      </p:ext>
+    </p:extLst>
+  </p:cSld>
+  <p:clrMapOvr>
+    <a:masterClrMapping/>
+  </p:clrMapOvr>
+</p:sld>
+</file>
+
+<file path=ppt/slides/slide14.xml><?xml version="1.0" encoding="utf-8"?>
+<p:sld xmlns:a="http://schemas.openxmlformats.org/drawingml/2006/main" xmlns:r="http://schemas.openxmlformats.org/officeDocument/2006/relationships" xmlns:p="http://schemas.openxmlformats.org/presentationml/2006/main">
+  <p:cSld>
+    <p:spTree>
+      <p:nvGrpSpPr>
+        <p:cNvPr id="1" name=""/>
+        <p:cNvGrpSpPr/>
+        <p:nvPr/>
+      </p:nvGrpSpPr>
+      <p:grpSpPr>
+        <a:xfrm>
+          <a:off x="0" y="0"/>
+          <a:ext cx="0" cy="0"/>
+          <a:chOff x="0" y="0"/>
+          <a:chExt cx="0" cy="0"/>
+        </a:xfrm>
+      </p:grpSpPr>
+      <p:sp>
+        <p:nvSpPr>
+          <p:cNvPr id="4" name="Text Placeholder 3">
+            <a:extLst>
+              <a:ext uri="{FF2B5EF4-FFF2-40B4-BE49-F238E27FC236}">
+                <a16:creationId xmlns:a16="http://schemas.microsoft.com/office/drawing/2014/main" id="{D1E798D3-E27F-F349-ADFD-6A2DD1E30093}"/>
+              </a:ext>
+            </a:extLst>
+          </p:cNvPr>
+          <p:cNvSpPr>
+            <a:spLocks noGrp="1"/>
+          </p:cNvSpPr>
+          <p:nvPr>
+            <p:ph type="body" sz="quarter" idx="16"/>
+          </p:nvPr>
+        </p:nvSpPr>
+        <p:spPr>
+          <a:xfrm>
+            <a:off x="954303" y="362445"/>
+            <a:ext cx="8038996" cy="631961"/>
+          </a:xfrm>
+        </p:spPr>
+        <p:txBody>
+          <a:bodyPr/>
+          <a:lstStyle/>
+          <a:p>
+            <a:r>
+              <a:rPr lang="en-US" dirty="0"/>
+              <a:t>Burndown charts</a:t>
+            </a:r>
+          </a:p>
+        </p:txBody>
+      </p:sp>
+      <p:pic>
+        <p:nvPicPr>
+          <p:cNvPr id="6" name="Picture 2" descr="Image result for burndown chart">
+            <a:extLst>
+              <a:ext uri="{FF2B5EF4-FFF2-40B4-BE49-F238E27FC236}">
+                <a16:creationId xmlns:a16="http://schemas.microsoft.com/office/drawing/2014/main" id="{EB16E535-F5FE-489A-A60A-2A917054A12A}"/>
+              </a:ext>
+            </a:extLst>
+          </p:cNvPr>
+          <p:cNvPicPr>
+            <a:picLocks noChangeAspect="1" noChangeArrowheads="1"/>
+          </p:cNvPicPr>
+          <p:nvPr/>
+        </p:nvPicPr>
+        <p:blipFill>
+          <a:blip r:embed="rId2">
+            <a:extLst>
+              <a:ext uri="{28A0092B-C50C-407E-A947-70E740481C1C}">
+                <a14:useLocalDpi xmlns:a14="http://schemas.microsoft.com/office/drawing/2010/main" val="0"/>
+              </a:ext>
+            </a:extLst>
+          </a:blip>
+          <a:srcRect/>
+          <a:stretch>
+            <a:fillRect/>
+          </a:stretch>
+        </p:blipFill>
+        <p:spPr bwMode="auto">
+          <a:xfrm>
+            <a:off x="3278299" y="1490662"/>
+            <a:ext cx="5715000" cy="3876675"/>
+          </a:xfrm>
+          <a:prstGeom prst="rect">
+            <a:avLst/>
+          </a:prstGeom>
+          <a:noFill/>
+          <a:extLst>
+            <a:ext uri="{909E8E84-426E-40DD-AFC4-6F175D3DCCD1}">
+              <a14:hiddenFill xmlns:a14="http://schemas.microsoft.com/office/drawing/2010/main">
+                <a:solidFill>
+                  <a:srgbClr val="FFFFFF"/>
+                </a:solidFill>
+              </a14:hiddenFill>
+            </a:ext>
+          </a:extLst>
+        </p:spPr>
+      </p:pic>
+    </p:spTree>
+    <p:extLst>
+      <p:ext uri="{BB962C8B-B14F-4D97-AF65-F5344CB8AC3E}">
+        <p14:creationId xmlns:p14="http://schemas.microsoft.com/office/powerpoint/2010/main" val="1101804564"/>
+      </p:ext>
+    </p:extLst>
+  </p:cSld>
+  <p:clrMapOvr>
+    <a:masterClrMapping/>
+  </p:clrMapOvr>
+</p:sld>
+</file>
+
+<file path=ppt/slides/slide15.xml><?xml version="1.0" encoding="utf-8"?>
+<p:sld xmlns:a="http://schemas.openxmlformats.org/drawingml/2006/main" xmlns:r="http://schemas.openxmlformats.org/officeDocument/2006/relationships" xmlns:p="http://schemas.openxmlformats.org/presentationml/2006/main">
+  <p:cSld>
+    <p:spTree>
+      <p:nvGrpSpPr>
+        <p:cNvPr id="1" name=""/>
+        <p:cNvGrpSpPr/>
+        <p:nvPr/>
+      </p:nvGrpSpPr>
+      <p:grpSpPr>
+        <a:xfrm>
+          <a:off x="0" y="0"/>
+          <a:ext cx="0" cy="0"/>
+          <a:chOff x="0" y="0"/>
+          <a:chExt cx="0" cy="0"/>
+        </a:xfrm>
+      </p:grpSpPr>
+      <p:sp>
+        <p:nvSpPr>
+          <p:cNvPr id="4" name="Text Placeholder 3">
+            <a:extLst>
+              <a:ext uri="{FF2B5EF4-FFF2-40B4-BE49-F238E27FC236}">
+                <a16:creationId xmlns:a16="http://schemas.microsoft.com/office/drawing/2014/main" id="{D1E798D3-E27F-F349-ADFD-6A2DD1E30093}"/>
+              </a:ext>
+            </a:extLst>
+          </p:cNvPr>
+          <p:cNvSpPr>
+            <a:spLocks noGrp="1"/>
+          </p:cNvSpPr>
+          <p:nvPr>
+            <p:ph type="body" sz="quarter" idx="16"/>
+          </p:nvPr>
+        </p:nvSpPr>
+        <p:spPr>
+          <a:xfrm>
+            <a:off x="954303" y="362445"/>
+            <a:ext cx="8038996" cy="631961"/>
+          </a:xfrm>
+        </p:spPr>
+        <p:txBody>
+          <a:bodyPr/>
+          <a:lstStyle/>
+          <a:p>
+            <a:r>
+              <a:rPr lang="en-US" dirty="0"/>
+              <a:t>Burndown charts</a:t>
+            </a:r>
+          </a:p>
+        </p:txBody>
+      </p:sp>
+      <p:sp>
+        <p:nvSpPr>
+          <p:cNvPr id="2" name="Rectangle 1">
+            <a:extLst>
+              <a:ext uri="{FF2B5EF4-FFF2-40B4-BE49-F238E27FC236}">
+                <a16:creationId xmlns:a16="http://schemas.microsoft.com/office/drawing/2014/main" id="{CCB53BC5-A1B3-4D44-92FD-D062DA53367F}"/>
+              </a:ext>
+            </a:extLst>
+          </p:cNvPr>
+          <p:cNvSpPr/>
+          <p:nvPr/>
+        </p:nvSpPr>
+        <p:spPr>
+          <a:xfrm>
+            <a:off x="4550160" y="2875002"/>
+            <a:ext cx="3091680" cy="1107996"/>
+          </a:xfrm>
+          <a:prstGeom prst="rect">
+            <a:avLst/>
+          </a:prstGeom>
+        </p:spPr>
+        <p:txBody>
+          <a:bodyPr wrap="none">
+            <a:spAutoFit/>
+          </a:bodyPr>
+          <a:lstStyle/>
+          <a:p>
+            <a:r>
+              <a:rPr lang="en-US" sz="6600" dirty="0"/>
+              <a:t>Example</a:t>
+            </a:r>
+            <a:endParaRPr lang="en-GB" sz="6600" dirty="0"/>
+          </a:p>
+        </p:txBody>
+      </p:sp>
+    </p:spTree>
+    <p:extLst>
+      <p:ext uri="{BB962C8B-B14F-4D97-AF65-F5344CB8AC3E}">
+        <p14:creationId xmlns:p14="http://schemas.microsoft.com/office/powerpoint/2010/main" val="3621303151"/>
+      </p:ext>
+    </p:extLst>
+  </p:cSld>
+  <p:clrMapOvr>
+    <a:masterClrMapping/>
+  </p:clrMapOvr>
+</p:sld>
+</file>
+
+<file path=ppt/slides/slide16.xml><?xml version="1.0" encoding="utf-8"?>
+<p:sld xmlns:a="http://schemas.openxmlformats.org/drawingml/2006/main" xmlns:r="http://schemas.openxmlformats.org/officeDocument/2006/relationships" xmlns:p="http://schemas.openxmlformats.org/presentationml/2006/main">
+  <p:cSld>
+    <p:bg>
+      <p:bgPr>
+        <a:solidFill>
+          <a:schemeClr val="tx1"/>
+        </a:solidFill>
+        <a:effectLst/>
+      </p:bgPr>
+    </p:bg>
+    <p:spTree>
+      <p:nvGrpSpPr>
+        <p:cNvPr id="1" name=""/>
+        <p:cNvGrpSpPr/>
+        <p:nvPr/>
+      </p:nvGrpSpPr>
+      <p:grpSpPr>
+        <a:xfrm>
+          <a:off x="0" y="0"/>
+          <a:ext cx="0" cy="0"/>
+          <a:chOff x="0" y="0"/>
+          <a:chExt cx="0" cy="0"/>
+        </a:xfrm>
+      </p:grpSpPr>
+      <p:sp>
+        <p:nvSpPr>
+          <p:cNvPr id="8" name="TextBox 7">
+            <a:extLst>
+              <a:ext uri="{FF2B5EF4-FFF2-40B4-BE49-F238E27FC236}">
+                <a16:creationId xmlns:a16="http://schemas.microsoft.com/office/drawing/2014/main" id="{6A5E0042-AC0D-4B3C-8E70-B3DD558EA421}"/>
+              </a:ext>
+            </a:extLst>
+          </p:cNvPr>
+          <p:cNvSpPr txBox="1"/>
+          <p:nvPr/>
+        </p:nvSpPr>
+        <p:spPr>
+          <a:xfrm>
+            <a:off x="3759399" y="2790363"/>
+            <a:ext cx="4673202" cy="1277273"/>
+          </a:xfrm>
+          <a:prstGeom prst="rect">
+            <a:avLst/>
+          </a:prstGeom>
+          <a:noFill/>
+        </p:spPr>
+        <p:txBody>
+          <a:bodyPr wrap="none" rtlCol="0">
+            <a:spAutoFit/>
+          </a:bodyPr>
+          <a:lstStyle/>
+          <a:p>
+            <a:pPr algn="r"/>
+            <a:r>
+              <a:rPr lang="en-US" sz="7700" dirty="0">
+                <a:solidFill>
+                  <a:schemeClr val="bg1"/>
+                </a:solidFill>
+              </a:rPr>
+              <a:t>Questions?</a:t>
+            </a:r>
+            <a:endParaRPr lang="en-GB" sz="7700" dirty="0"/>
+          </a:p>
+        </p:txBody>
+      </p:sp>
+      <p:sp>
+        <p:nvSpPr>
+          <p:cNvPr id="3" name="AutoShape 2" descr="https://falmouthac.sharepoint.com/teams/games/GameDev/Image%20Bank/2017%2001%2017%20Programmers%20Guild%20Workshop/WP_20170117_11_55_41_Pro.jpg">
+            <a:extLst>
+              <a:ext uri="{FF2B5EF4-FFF2-40B4-BE49-F238E27FC236}">
+                <a16:creationId xmlns:a16="http://schemas.microsoft.com/office/drawing/2014/main" id="{7F32BB6C-44F2-4A5C-81D5-45F5683591FD}"/>
+              </a:ext>
+            </a:extLst>
+          </p:cNvPr>
+          <p:cNvSpPr>
+            <a:spLocks noChangeAspect="1" noChangeArrowheads="1"/>
+          </p:cNvSpPr>
+          <p:nvPr/>
+        </p:nvSpPr>
+        <p:spPr bwMode="auto">
+          <a:xfrm>
+            <a:off x="5943600" y="3276600"/>
+            <a:ext cx="304800" cy="304800"/>
+          </a:xfrm>
+          <a:prstGeom prst="rect">
+            <a:avLst/>
+          </a:prstGeom>
+          <a:noFill/>
+          <a:extLst>
+            <a:ext uri="{909E8E84-426E-40DD-AFC4-6F175D3DCCD1}">
+              <a14:hiddenFill xmlns:a14="http://schemas.microsoft.com/office/drawing/2010/main">
+                <a:solidFill>
+                  <a:srgbClr val="FFFFFF"/>
+                </a:solidFill>
+              </a14:hiddenFill>
+            </a:ext>
+          </a:extLst>
+        </p:spPr>
+        <p:txBody>
+          <a:bodyPr vert="horz" wrap="square" lIns="91440" tIns="45720" rIns="91440" bIns="45720" numCol="1" anchor="t" anchorCtr="0" compatLnSpc="1">
+            <a:prstTxWarp prst="textNoShape">
+              <a:avLst/>
+            </a:prstTxWarp>
+          </a:bodyPr>
+          <a:lstStyle/>
+          <a:p>
+            <a:endParaRPr lang="en-GB"/>
+          </a:p>
+        </p:txBody>
+      </p:sp>
+    </p:spTree>
+    <p:extLst>
+      <p:ext uri="{BB962C8B-B14F-4D97-AF65-F5344CB8AC3E}">
+        <p14:creationId xmlns:p14="http://schemas.microsoft.com/office/powerpoint/2010/main" val="2124369782"/>
+      </p:ext>
+    </p:extLst>
+  </p:cSld>
+  <p:clrMapOvr>
+    <a:masterClrMapping/>
+  </p:clrMapOvr>
+</p:sld>
+</file>
+
+<file path=ppt/slides/slide2.xml><?xml version="1.0" encoding="utf-8"?>
+<p:sld xmlns:a="http://schemas.openxmlformats.org/drawingml/2006/main" xmlns:r="http://schemas.openxmlformats.org/officeDocument/2006/relationships" xmlns:p="http://schemas.openxmlformats.org/presentationml/2006/main">
+  <p:cSld>
+    <p:bg>
+      <p:bgPr>
+        <a:solidFill>
+          <a:schemeClr val="tx1"/>
+        </a:solidFill>
+        <a:effectLst/>
+      </p:bgPr>
+    </p:bg>
+    <p:spTree>
+      <p:nvGrpSpPr>
+        <p:cNvPr id="1" name=""/>
+        <p:cNvGrpSpPr/>
+        <p:nvPr/>
+      </p:nvGrpSpPr>
+      <p:grpSpPr>
+        <a:xfrm>
+          <a:off x="0" y="0"/>
+          <a:ext cx="0" cy="0"/>
+          <a:chOff x="0" y="0"/>
+          <a:chExt cx="0" cy="0"/>
+        </a:xfrm>
+      </p:grpSpPr>
+      <p:sp>
+        <p:nvSpPr>
+          <p:cNvPr id="7" name="Content Placeholder 1"/>
+          <p:cNvSpPr txBox="1">
+            <a:spLocks/>
+          </p:cNvSpPr>
+          <p:nvPr/>
+        </p:nvSpPr>
+        <p:spPr>
+          <a:xfrm>
+            <a:off x="5286116" y="2016777"/>
+            <a:ext cx="6369426" cy="1412223"/>
+          </a:xfrm>
+          <a:prstGeom prst="rect">
+            <a:avLst/>
+          </a:prstGeom>
+        </p:spPr>
+        <p:txBody>
+          <a:bodyPr/>
+          <a:lstStyle>
+            <a:lvl1pPr marL="228600" indent="-228600" algn="l" defTabSz="914400" rtl="0" eaLnBrk="1" latinLnBrk="0" hangingPunct="1">
+              <a:lnSpc>
+                <a:spcPct val="90000"/>
+              </a:lnSpc>
+              <a:spcBef>
+                <a:spcPts val="1000"/>
+              </a:spcBef>
+              <a:buFont typeface="Arial" panose="020B0604020202020204" pitchFamily="34" charset="0"/>
+              <a:buChar char="•"/>
+              <a:defRPr sz="2800" kern="1200">
+                <a:solidFill>
+                  <a:schemeClr val="tx1"/>
+                </a:solidFill>
+                <a:latin typeface="+mn-lt"/>
+                <a:ea typeface="+mn-ea"/>
+                <a:cs typeface="+mn-cs"/>
+              </a:defRPr>
+            </a:lvl1pPr>
+            <a:lvl2pPr marL="685800" indent="-228600" algn="l" defTabSz="914400" rtl="0" eaLnBrk="1" latinLnBrk="0" hangingPunct="1">
+              <a:lnSpc>
+                <a:spcPct val="90000"/>
+              </a:lnSpc>
+              <a:spcBef>
+                <a:spcPts val="500"/>
+              </a:spcBef>
+              <a:buFont typeface="Arial" panose="020B0604020202020204" pitchFamily="34" charset="0"/>
+              <a:buChar char="•"/>
+              <a:defRPr sz="2400" kern="1200">
+                <a:solidFill>
+                  <a:schemeClr val="tx1"/>
+                </a:solidFill>
+                <a:latin typeface="+mn-lt"/>
+                <a:ea typeface="+mn-ea"/>
+                <a:cs typeface="+mn-cs"/>
+              </a:defRPr>
+            </a:lvl2pPr>
+            <a:lvl3pPr marL="1143000" indent="-228600" algn="l" defTabSz="914400" rtl="0" eaLnBrk="1" latinLnBrk="0" hangingPunct="1">
+              <a:lnSpc>
+                <a:spcPct val="90000"/>
+              </a:lnSpc>
+              <a:spcBef>
+                <a:spcPts val="500"/>
+              </a:spcBef>
+              <a:buFont typeface="Arial" panose="020B0604020202020204" pitchFamily="34" charset="0"/>
+              <a:buChar char="•"/>
+              <a:defRPr sz="2000" kern="1200">
+                <a:solidFill>
+                  <a:schemeClr val="tx1"/>
+                </a:solidFill>
+                <a:latin typeface="+mn-lt"/>
+                <a:ea typeface="+mn-ea"/>
+                <a:cs typeface="+mn-cs"/>
+              </a:defRPr>
+            </a:lvl3pPr>
+            <a:lvl4pPr marL="1600200" indent="-228600" algn="l" defTabSz="914400" rtl="0" eaLnBrk="1" latinLnBrk="0" hangingPunct="1">
+              <a:lnSpc>
+                <a:spcPct val="90000"/>
+              </a:lnSpc>
+              <a:spcBef>
+                <a:spcPts val="500"/>
+              </a:spcBef>
+              <a:buFont typeface="Arial" panose="020B0604020202020204" pitchFamily="34" charset="0"/>
+              <a:buChar char="•"/>
+              <a:defRPr sz="1800" kern="1200">
+                <a:solidFill>
+                  <a:schemeClr val="tx1"/>
+                </a:solidFill>
+                <a:latin typeface="+mn-lt"/>
+                <a:ea typeface="+mn-ea"/>
+                <a:cs typeface="+mn-cs"/>
+              </a:defRPr>
+            </a:lvl4pPr>
+            <a:lvl5pPr marL="2057400" indent="-228600" algn="l" defTabSz="914400" rtl="0" eaLnBrk="1" latinLnBrk="0" hangingPunct="1">
+              <a:lnSpc>
+                <a:spcPct val="90000"/>
+              </a:lnSpc>
+              <a:spcBef>
+                <a:spcPts val="500"/>
+              </a:spcBef>
+              <a:buFont typeface="Arial" panose="020B0604020202020204" pitchFamily="34" charset="0"/>
+              <a:buChar char="•"/>
+              <a:defRPr sz="1800" kern="1200">
+                <a:solidFill>
+                  <a:schemeClr val="tx1"/>
+                </a:solidFill>
+                <a:latin typeface="+mn-lt"/>
+                <a:ea typeface="+mn-ea"/>
+                <a:cs typeface="+mn-cs"/>
+              </a:defRPr>
+            </a:lvl5pPr>
+            <a:lvl6pPr marL="2514600" indent="-228600" algn="l" defTabSz="914400" rtl="0" eaLnBrk="1" latinLnBrk="0" hangingPunct="1">
+              <a:lnSpc>
+                <a:spcPct val="90000"/>
+              </a:lnSpc>
+              <a:spcBef>
+                <a:spcPts val="500"/>
+              </a:spcBef>
+              <a:buFont typeface="Arial" panose="020B0604020202020204" pitchFamily="34" charset="0"/>
+              <a:buChar char="•"/>
+              <a:defRPr sz="1800" kern="1200">
+                <a:solidFill>
+                  <a:schemeClr val="tx1"/>
+                </a:solidFill>
+                <a:latin typeface="+mn-lt"/>
+                <a:ea typeface="+mn-ea"/>
+                <a:cs typeface="+mn-cs"/>
+              </a:defRPr>
+            </a:lvl6pPr>
+            <a:lvl7pPr marL="2971800" indent="-228600" algn="l" defTabSz="914400" rtl="0" eaLnBrk="1" latinLnBrk="0" hangingPunct="1">
+              <a:lnSpc>
+                <a:spcPct val="90000"/>
+              </a:lnSpc>
+              <a:spcBef>
+                <a:spcPts val="500"/>
+              </a:spcBef>
+              <a:buFont typeface="Arial" panose="020B0604020202020204" pitchFamily="34" charset="0"/>
+              <a:buChar char="•"/>
+              <a:defRPr sz="1800" kern="1200">
+                <a:solidFill>
+                  <a:schemeClr val="tx1"/>
+                </a:solidFill>
+                <a:latin typeface="+mn-lt"/>
+                <a:ea typeface="+mn-ea"/>
+                <a:cs typeface="+mn-cs"/>
+              </a:defRPr>
+            </a:lvl7pPr>
+            <a:lvl8pPr marL="3429000" indent="-228600" algn="l" defTabSz="914400" rtl="0" eaLnBrk="1" latinLnBrk="0" hangingPunct="1">
+              <a:lnSpc>
+                <a:spcPct val="90000"/>
+              </a:lnSpc>
+              <a:spcBef>
+                <a:spcPts val="500"/>
+              </a:spcBef>
+              <a:buFont typeface="Arial" panose="020B0604020202020204" pitchFamily="34" charset="0"/>
+              <a:buChar char="•"/>
+              <a:defRPr sz="1800" kern="1200">
+                <a:solidFill>
+                  <a:schemeClr val="tx1"/>
+                </a:solidFill>
+                <a:latin typeface="+mn-lt"/>
+                <a:ea typeface="+mn-ea"/>
+                <a:cs typeface="+mn-cs"/>
+              </a:defRPr>
+            </a:lvl8pPr>
+            <a:lvl9pPr marL="3886200" indent="-228600" algn="l" defTabSz="914400" rtl="0" eaLnBrk="1" latinLnBrk="0" hangingPunct="1">
+              <a:lnSpc>
+                <a:spcPct val="90000"/>
+              </a:lnSpc>
+              <a:spcBef>
+                <a:spcPts val="500"/>
+              </a:spcBef>
+              <a:buFont typeface="Arial" panose="020B0604020202020204" pitchFamily="34" charset="0"/>
+              <a:buChar char="•"/>
+              <a:defRPr sz="1800" kern="1200">
+                <a:solidFill>
+                  <a:schemeClr val="tx1"/>
+                </a:solidFill>
+                <a:latin typeface="+mn-lt"/>
+                <a:ea typeface="+mn-ea"/>
+                <a:cs typeface="+mn-cs"/>
+              </a:defRPr>
+            </a:lvl9pPr>
+          </a:lstStyle>
+          <a:p>
+            <a:pPr marL="0" indent="0">
+              <a:buNone/>
+            </a:pPr>
+            <a:r>
+              <a:rPr lang="en-US" dirty="0">
+                <a:solidFill>
+                  <a:schemeClr val="bg1"/>
+                </a:solidFill>
+              </a:rPr>
+              <a:t> </a:t>
+            </a:r>
+          </a:p>
+        </p:txBody>
+      </p:sp>
+      <p:sp>
+        <p:nvSpPr>
+          <p:cNvPr id="8" name="TextBox 7">
+            <a:extLst>
+              <a:ext uri="{FF2B5EF4-FFF2-40B4-BE49-F238E27FC236}">
+                <a16:creationId xmlns:a16="http://schemas.microsoft.com/office/drawing/2014/main" id="{6A5E0042-AC0D-4B3C-8E70-B3DD558EA421}"/>
+              </a:ext>
+            </a:extLst>
+          </p:cNvPr>
+          <p:cNvSpPr txBox="1"/>
+          <p:nvPr/>
+        </p:nvSpPr>
+        <p:spPr>
+          <a:xfrm>
+            <a:off x="1377680" y="2676135"/>
+            <a:ext cx="9741439" cy="3123932"/>
+          </a:xfrm>
+          <a:prstGeom prst="rect">
+            <a:avLst/>
+          </a:prstGeom>
+          <a:noFill/>
+        </p:spPr>
+        <p:txBody>
+          <a:bodyPr wrap="square" rtlCol="0">
+            <a:spAutoFit/>
+          </a:bodyPr>
+          <a:lstStyle/>
+          <a:p>
+            <a:r>
+              <a:rPr lang="en-US" sz="7700" dirty="0">
+                <a:solidFill>
+                  <a:schemeClr val="bg1"/>
+                </a:solidFill>
+              </a:rPr>
               <a:t>Planning: </a:t>
             </a:r>
           </a:p>
@@ -5623,7 +6769,23 @@
                   <a:schemeClr val="bg1"/>
                 </a:solidFill>
               </a:rPr>
-              <a:t>Towards the final hurdle</a:t>
+              <a:t>Or how I actually made a game in 2</a:t>
+            </a:r>
+            <a:r>
+              <a:rPr lang="en-US" sz="6000" baseline="30000" dirty="0">
+                <a:solidFill>
+                  <a:schemeClr val="bg1"/>
+                </a:solidFill>
+              </a:rPr>
+              <a:t>nd</a:t>
+            </a:r>
+            <a:r>
+              <a:rPr lang="en-US" sz="6000" dirty="0">
+                <a:solidFill>
+                  <a:schemeClr val="bg1"/>
+                </a:solidFill>
+              </a:rPr>
+              <a:t> year</a:t>
             </a:r>
           </a:p>
         </p:txBody>
@@ -5737,7 +6899,19 @@
             </a:pPr>
             <a:r>
               <a:rPr lang="en-US" dirty="0"/>
-              <a:t>work in multi-skilled teams to make a proof of concept of a digital product </a:t>
+              <a:t>We are now in </a:t>
+            </a:r>
+            <a:r>
+              <a:rPr lang="en-US" b="1" dirty="0"/>
+              <a:t>Week 3</a:t>
+            </a:r>
+            <a:r>
+              <a:rPr lang="en-US" dirty="0"/>
+              <a:t> of </a:t>
+            </a:r>
+            <a:r>
+              <a:rPr lang="en-US" b="1" dirty="0"/>
+              <a:t>SB2</a:t>
             </a:r>
           </a:p>
           <a:p>
@@ -5746,8 +6920,12 @@
               <a:buChar char="•"/>
             </a:pPr>
             <a:r>
-              <a:rPr lang="en-GB" dirty="0"/>
-              <a:t>You gain hands-on experience of the development pipeline and of production in an ‘agile’ context</a:t>
+              <a:rPr lang="en-US" dirty="0"/>
+              <a:t>The Expo day will be in </a:t>
+            </a:r>
+            <a:r>
+              <a:rPr lang="en-US" b="1" dirty="0"/>
+              <a:t>Week 13</a:t>
             </a:r>
           </a:p>
           <a:p>
@@ -5756,8 +6934,30 @@
               <a:buChar char="•"/>
             </a:pPr>
             <a:r>
-              <a:rPr lang="en-GB" dirty="0"/>
-              <a:t>The course team reinforce iterative methods as they supervise and monitor the work-in-progress </a:t>
+              <a:rPr lang="en-US" dirty="0"/>
+              <a:t>This means we have around </a:t>
+            </a:r>
+            <a:r>
+              <a:rPr lang="en-US" b="1" dirty="0"/>
+              <a:t>10 weeks </a:t>
+            </a:r>
+            <a:r>
+              <a:rPr lang="en-US" dirty="0"/>
+              <a:t>to complete development (not including Easter!)</a:t>
+            </a:r>
+          </a:p>
+          <a:p>
+            <a:pPr marL="1143000" lvl="1" indent="-457200"/>
+            <a:r>
+              <a:rPr lang="en-US" dirty="0"/>
+              <a:t>We need to start considering the scope of our game</a:t>
+            </a:r>
+          </a:p>
+          <a:p>
+            <a:pPr marL="1143000" lvl="1" indent="-457200"/>
+            <a:r>
+              <a:rPr lang="en-US" dirty="0"/>
+              <a:t>We need to start planning for our project deadlines</a:t>
             </a:r>
           </a:p>
           <a:p>
@@ -5766,9 +6966,22 @@
               <a:buChar char="•"/>
             </a:pPr>
             <a:r>
-              <a:rPr lang="en-GB" dirty="0"/>
-              <a:t>By the end of the module, your team should have a small functional proof of concept.</a:t>
-            </a:r>
+              <a:rPr lang="en-US" dirty="0"/>
+              <a:t>We are going to use this lecture to discuss some tools and strategies to  </a:t>
+            </a:r>
+          </a:p>
+          <a:p>
+            <a:pPr marL="457200" indent="-457200">
+              <a:buFont typeface="Arial" panose="020B0604020202020204" pitchFamily="34" charset="0"/>
+              <a:buChar char="•"/>
+            </a:pPr>
+            <a:endParaRPr lang="en-US" dirty="0"/>
+          </a:p>
+          <a:p>
+            <a:pPr marL="457200" indent="-457200">
+              <a:buFont typeface="Arial" panose="020B0604020202020204" pitchFamily="34" charset="0"/>
+              <a:buChar char="•"/>
+            </a:pPr>
             <a:endParaRPr lang="en-US" dirty="0"/>
           </a:p>
         </p:txBody>
@@ -5801,7 +7014,7 @@
           <a:p>
             <a:r>
               <a:rPr lang="en-US" dirty="0"/>
-              <a:t>We </a:t>
+              <a:t>Introduction </a:t>
             </a:r>
           </a:p>
         </p:txBody>
@@ -5820,139 +7033,6 @@
 </file>
 
 <file path=ppt/slides/slide4.xml><?xml version="1.0" encoding="utf-8"?>
-<p:sld xmlns:a="http://schemas.openxmlformats.org/drawingml/2006/main" xmlns:r="http://schemas.openxmlformats.org/officeDocument/2006/relationships" xmlns:p="http://schemas.openxmlformats.org/presentationml/2006/main">
-  <p:cSld>
-    <p:spTree>
-      <p:nvGrpSpPr>
-        <p:cNvPr id="1" name=""/>
-        <p:cNvGrpSpPr/>
-        <p:nvPr/>
-      </p:nvGrpSpPr>
-      <p:grpSpPr>
-        <a:xfrm>
-          <a:off x="0" y="0"/>
-          <a:ext cx="0" cy="0"/>
-          <a:chOff x="0" y="0"/>
-          <a:chExt cx="0" cy="0"/>
-        </a:xfrm>
-      </p:grpSpPr>
-      <p:sp>
-        <p:nvSpPr>
-          <p:cNvPr id="3" name="Text Placeholder 2">
-            <a:extLst>
-              <a:ext uri="{FF2B5EF4-FFF2-40B4-BE49-F238E27FC236}">
-                <a16:creationId xmlns:a16="http://schemas.microsoft.com/office/drawing/2014/main" id="{6E3909CC-9819-6445-A908-8CD6E18821C6}"/>
-              </a:ext>
-            </a:extLst>
-          </p:cNvPr>
-          <p:cNvSpPr>
-            <a:spLocks noGrp="1"/>
-          </p:cNvSpPr>
-          <p:nvPr>
-            <p:ph type="body" sz="quarter" idx="14"/>
-          </p:nvPr>
-        </p:nvSpPr>
-        <p:spPr>
-          <a:xfrm>
-            <a:off x="954303" y="1193058"/>
-            <a:ext cx="10363054" cy="4306594"/>
-          </a:xfrm>
-        </p:spPr>
-        <p:txBody>
-          <a:bodyPr>
-            <a:normAutofit/>
-          </a:bodyPr>
-          <a:lstStyle/>
-          <a:p>
-            <a:pPr marL="457200" indent="-457200">
-              <a:buFont typeface="Arial" panose="020B0604020202020204" pitchFamily="34" charset="0"/>
-              <a:buChar char="•"/>
-            </a:pPr>
-            <a:r>
-              <a:rPr lang="en-GB" dirty="0"/>
-              <a:t>MOSCOW – Gear Up</a:t>
-            </a:r>
-          </a:p>
-          <a:p>
-            <a:pPr marL="457200" indent="-457200">
-              <a:buFont typeface="Arial" panose="020B0604020202020204" pitchFamily="34" charset="0"/>
-              <a:buChar char="•"/>
-            </a:pPr>
-            <a:r>
-              <a:rPr lang="en-GB" dirty="0"/>
-              <a:t>Time Boxing – GEAR UP</a:t>
-            </a:r>
-          </a:p>
-          <a:p>
-            <a:pPr marL="457200" indent="-457200">
-              <a:buFont typeface="Arial" panose="020B0604020202020204" pitchFamily="34" charset="0"/>
-              <a:buChar char="•"/>
-            </a:pPr>
-            <a:r>
-              <a:rPr lang="en-GB" dirty="0"/>
-              <a:t>Wall of PAIN – Gear UP</a:t>
-            </a:r>
-          </a:p>
-          <a:p>
-            <a:pPr marL="457200" indent="-457200">
-              <a:buFont typeface="Arial" panose="020B0604020202020204" pitchFamily="34" charset="0"/>
-              <a:buChar char="•"/>
-            </a:pPr>
-            <a:r>
-              <a:rPr lang="en-GB" dirty="0"/>
-              <a:t>Burn Down Chart - ?</a:t>
-            </a:r>
-            <a:endParaRPr lang="en-US" dirty="0"/>
-          </a:p>
-        </p:txBody>
-      </p:sp>
-      <p:sp>
-        <p:nvSpPr>
-          <p:cNvPr id="4" name="Text Placeholder 3">
-            <a:extLst>
-              <a:ext uri="{FF2B5EF4-FFF2-40B4-BE49-F238E27FC236}">
-                <a16:creationId xmlns:a16="http://schemas.microsoft.com/office/drawing/2014/main" id="{D1E798D3-E27F-F349-ADFD-6A2DD1E30093}"/>
-              </a:ext>
-            </a:extLst>
-          </p:cNvPr>
-          <p:cNvSpPr>
-            <a:spLocks noGrp="1"/>
-          </p:cNvSpPr>
-          <p:nvPr>
-            <p:ph type="body" sz="quarter" idx="16"/>
-          </p:nvPr>
-        </p:nvSpPr>
-        <p:spPr>
-          <a:xfrm>
-            <a:off x="954303" y="362445"/>
-            <a:ext cx="8038996" cy="631961"/>
-          </a:xfrm>
-        </p:spPr>
-        <p:txBody>
-          <a:bodyPr/>
-          <a:lstStyle/>
-          <a:p>
-            <a:r>
-              <a:rPr lang="en-US" dirty="0"/>
-              <a:t>Stuff to Talk About</a:t>
-            </a:r>
-          </a:p>
-        </p:txBody>
-      </p:sp>
-    </p:spTree>
-    <p:extLst>
-      <p:ext uri="{BB962C8B-B14F-4D97-AF65-F5344CB8AC3E}">
-        <p14:creationId xmlns:p14="http://schemas.microsoft.com/office/powerpoint/2010/main" val="3666349528"/>
-      </p:ext>
-    </p:extLst>
-  </p:cSld>
-  <p:clrMapOvr>
-    <a:masterClrMapping/>
-  </p:clrMapOvr>
-</p:sld>
-</file>
-
-<file path=ppt/slides/slide5.xml><?xml version="1.0" encoding="utf-8"?>
 <p:sld xmlns:a="http://schemas.openxmlformats.org/drawingml/2006/main" xmlns:r="http://schemas.openxmlformats.org/officeDocument/2006/relationships" xmlns:p="http://schemas.openxmlformats.org/presentationml/2006/main">
   <p:cSld>
     <p:bg>
@@ -5979,6 +7059,204 @@
       </p:grpSpPr>
       <p:sp>
         <p:nvSpPr>
+          <p:cNvPr id="7" name="Content Placeholder 1"/>
+          <p:cNvSpPr txBox="1">
+            <a:spLocks/>
+          </p:cNvSpPr>
+          <p:nvPr/>
+        </p:nvSpPr>
+        <p:spPr>
+          <a:xfrm>
+            <a:off x="5286116" y="2016777"/>
+            <a:ext cx="6369426" cy="1412223"/>
+          </a:xfrm>
+          <a:prstGeom prst="rect">
+            <a:avLst/>
+          </a:prstGeom>
+        </p:spPr>
+        <p:txBody>
+          <a:bodyPr/>
+          <a:lstStyle>
+            <a:lvl1pPr marL="228600" indent="-228600" algn="l" defTabSz="914400" rtl="0" eaLnBrk="1" latinLnBrk="0" hangingPunct="1">
+              <a:lnSpc>
+                <a:spcPct val="90000"/>
+              </a:lnSpc>
+              <a:spcBef>
+                <a:spcPts val="1000"/>
+              </a:spcBef>
+              <a:buFont typeface="Arial" panose="020B0604020202020204" pitchFamily="34" charset="0"/>
+              <a:buChar char="•"/>
+              <a:defRPr sz="2800" kern="1200">
+                <a:solidFill>
+                  <a:schemeClr val="tx1"/>
+                </a:solidFill>
+                <a:latin typeface="+mn-lt"/>
+                <a:ea typeface="+mn-ea"/>
+                <a:cs typeface="+mn-cs"/>
+              </a:defRPr>
+            </a:lvl1pPr>
+            <a:lvl2pPr marL="685800" indent="-228600" algn="l" defTabSz="914400" rtl="0" eaLnBrk="1" latinLnBrk="0" hangingPunct="1">
+              <a:lnSpc>
+                <a:spcPct val="90000"/>
+              </a:lnSpc>
+              <a:spcBef>
+                <a:spcPts val="500"/>
+              </a:spcBef>
+              <a:buFont typeface="Arial" panose="020B0604020202020204" pitchFamily="34" charset="0"/>
+              <a:buChar char="•"/>
+              <a:defRPr sz="2400" kern="1200">
+                <a:solidFill>
+                  <a:schemeClr val="tx1"/>
+                </a:solidFill>
+                <a:latin typeface="+mn-lt"/>
+                <a:ea typeface="+mn-ea"/>
+                <a:cs typeface="+mn-cs"/>
+              </a:defRPr>
+            </a:lvl2pPr>
+            <a:lvl3pPr marL="1143000" indent="-228600" algn="l" defTabSz="914400" rtl="0" eaLnBrk="1" latinLnBrk="0" hangingPunct="1">
+              <a:lnSpc>
+                <a:spcPct val="90000"/>
+              </a:lnSpc>
+              <a:spcBef>
+                <a:spcPts val="500"/>
+              </a:spcBef>
+              <a:buFont typeface="Arial" panose="020B0604020202020204" pitchFamily="34" charset="0"/>
+              <a:buChar char="•"/>
+              <a:defRPr sz="2000" kern="1200">
+                <a:solidFill>
+                  <a:schemeClr val="tx1"/>
+                </a:solidFill>
+                <a:latin typeface="+mn-lt"/>
+                <a:ea typeface="+mn-ea"/>
+                <a:cs typeface="+mn-cs"/>
+              </a:defRPr>
+            </a:lvl3pPr>
+            <a:lvl4pPr marL="1600200" indent="-228600" algn="l" defTabSz="914400" rtl="0" eaLnBrk="1" latinLnBrk="0" hangingPunct="1">
+              <a:lnSpc>
+                <a:spcPct val="90000"/>
+              </a:lnSpc>
+              <a:spcBef>
+                <a:spcPts val="500"/>
+              </a:spcBef>
+              <a:buFont typeface="Arial" panose="020B0604020202020204" pitchFamily="34" charset="0"/>
+              <a:buChar char="•"/>
+              <a:defRPr sz="1800" kern="1200">
+                <a:solidFill>
+                  <a:schemeClr val="tx1"/>
+                </a:solidFill>
+                <a:latin typeface="+mn-lt"/>
+                <a:ea typeface="+mn-ea"/>
+                <a:cs typeface="+mn-cs"/>
+              </a:defRPr>
+            </a:lvl4pPr>
+            <a:lvl5pPr marL="2057400" indent="-228600" algn="l" defTabSz="914400" rtl="0" eaLnBrk="1" latinLnBrk="0" hangingPunct="1">
+              <a:lnSpc>
+                <a:spcPct val="90000"/>
+              </a:lnSpc>
+              <a:spcBef>
+                <a:spcPts val="500"/>
+              </a:spcBef>
+              <a:buFont typeface="Arial" panose="020B0604020202020204" pitchFamily="34" charset="0"/>
+              <a:buChar char="•"/>
+              <a:defRPr sz="1800" kern="1200">
+                <a:solidFill>
+                  <a:schemeClr val="tx1"/>
+                </a:solidFill>
+                <a:latin typeface="+mn-lt"/>
+                <a:ea typeface="+mn-ea"/>
+                <a:cs typeface="+mn-cs"/>
+              </a:defRPr>
+            </a:lvl5pPr>
+            <a:lvl6pPr marL="2514600" indent="-228600" algn="l" defTabSz="914400" rtl="0" eaLnBrk="1" latinLnBrk="0" hangingPunct="1">
+              <a:lnSpc>
+                <a:spcPct val="90000"/>
+              </a:lnSpc>
+              <a:spcBef>
+                <a:spcPts val="500"/>
+              </a:spcBef>
+              <a:buFont typeface="Arial" panose="020B0604020202020204" pitchFamily="34" charset="0"/>
+              <a:buChar char="•"/>
+              <a:defRPr sz="1800" kern="1200">
+                <a:solidFill>
+                  <a:schemeClr val="tx1"/>
+                </a:solidFill>
+                <a:latin typeface="+mn-lt"/>
+                <a:ea typeface="+mn-ea"/>
+                <a:cs typeface="+mn-cs"/>
+              </a:defRPr>
+            </a:lvl6pPr>
+            <a:lvl7pPr marL="2971800" indent="-228600" algn="l" defTabSz="914400" rtl="0" eaLnBrk="1" latinLnBrk="0" hangingPunct="1">
+              <a:lnSpc>
+                <a:spcPct val="90000"/>
+              </a:lnSpc>
+              <a:spcBef>
+                <a:spcPts val="500"/>
+              </a:spcBef>
+              <a:buFont typeface="Arial" panose="020B0604020202020204" pitchFamily="34" charset="0"/>
+              <a:buChar char="•"/>
+              <a:defRPr sz="1800" kern="1200">
+                <a:solidFill>
+                  <a:schemeClr val="tx1"/>
+                </a:solidFill>
+                <a:latin typeface="+mn-lt"/>
+                <a:ea typeface="+mn-ea"/>
+                <a:cs typeface="+mn-cs"/>
+              </a:defRPr>
+            </a:lvl7pPr>
+            <a:lvl8pPr marL="3429000" indent="-228600" algn="l" defTabSz="914400" rtl="0" eaLnBrk="1" latinLnBrk="0" hangingPunct="1">
+              <a:lnSpc>
+                <a:spcPct val="90000"/>
+              </a:lnSpc>
+              <a:spcBef>
+                <a:spcPts val="500"/>
+              </a:spcBef>
+              <a:buFont typeface="Arial" panose="020B0604020202020204" pitchFamily="34" charset="0"/>
+              <a:buChar char="•"/>
+              <a:defRPr sz="1800" kern="1200">
+                <a:solidFill>
+                  <a:schemeClr val="tx1"/>
+                </a:solidFill>
+                <a:latin typeface="+mn-lt"/>
+                <a:ea typeface="+mn-ea"/>
+                <a:cs typeface="+mn-cs"/>
+              </a:defRPr>
+            </a:lvl8pPr>
+            <a:lvl9pPr marL="3886200" indent="-228600" algn="l" defTabSz="914400" rtl="0" eaLnBrk="1" latinLnBrk="0" hangingPunct="1">
+              <a:lnSpc>
+                <a:spcPct val="90000"/>
+              </a:lnSpc>
+              <a:spcBef>
+                <a:spcPts val="500"/>
+              </a:spcBef>
+              <a:buFont typeface="Arial" panose="020B0604020202020204" pitchFamily="34" charset="0"/>
+              <a:buChar char="•"/>
+              <a:defRPr sz="1800" kern="1200">
+                <a:solidFill>
+                  <a:schemeClr val="tx1"/>
+                </a:solidFill>
+                <a:latin typeface="+mn-lt"/>
+                <a:ea typeface="+mn-ea"/>
+                <a:cs typeface="+mn-cs"/>
+              </a:defRPr>
+            </a:lvl9pPr>
+          </a:lstStyle>
+          <a:p>
+            <a:pPr marL="0" indent="0">
+              <a:buNone/>
+            </a:pPr>
+            <a:r>
+              <a:rPr lang="en-US" dirty="0">
+                <a:solidFill>
+                  <a:schemeClr val="bg1"/>
+                </a:solidFill>
+              </a:rPr>
+              <a:t> </a:t>
+            </a:r>
+          </a:p>
+        </p:txBody>
+      </p:sp>
+      <p:sp>
+        <p:nvSpPr>
           <p:cNvPr id="8" name="TextBox 7">
             <a:extLst>
               <a:ext uri="{FF2B5EF4-FFF2-40B4-BE49-F238E27FC236}">
@@ -5991,8 +7269,8 @@
         </p:nvSpPr>
         <p:spPr>
           <a:xfrm>
-            <a:off x="3759399" y="2790363"/>
-            <a:ext cx="4673202" cy="1277273"/>
+            <a:off x="1377680" y="2676135"/>
+            <a:ext cx="9741439" cy="1277273"/>
           </a:xfrm>
           <a:prstGeom prst="rect">
             <a:avLst/>
@@ -6000,21 +7278,24 @@
           <a:noFill/>
         </p:spPr>
         <p:txBody>
-          <a:bodyPr wrap="none" rtlCol="0">
+          <a:bodyPr wrap="square" rtlCol="0">
             <a:spAutoFit/>
           </a:bodyPr>
           <a:lstStyle/>
           <a:p>
-            <a:pPr algn="r"/>
             <a:r>
               <a:rPr lang="en-US" sz="7700" dirty="0">
                 <a:solidFill>
                   <a:schemeClr val="bg1"/>
                 </a:solidFill>
               </a:rPr>
-              <a:t>Questions?</a:t>
-            </a:r>
-            <a:endParaRPr lang="en-GB" sz="7700" dirty="0"/>
+              <a:t>Unblocking</a:t>
+            </a:r>
+            <a:endParaRPr lang="en-US" sz="6000" dirty="0">
+              <a:solidFill>
+                <a:schemeClr val="bg1"/>
+              </a:solidFill>
+            </a:endParaRPr>
           </a:p>
         </p:txBody>
       </p:sp>
@@ -6066,7 +7347,967 @@
     </p:spTree>
     <p:extLst>
       <p:ext uri="{BB962C8B-B14F-4D97-AF65-F5344CB8AC3E}">
-        <p14:creationId xmlns:p14="http://schemas.microsoft.com/office/powerpoint/2010/main" val="2124369782"/>
+        <p14:creationId xmlns:p14="http://schemas.microsoft.com/office/powerpoint/2010/main" val="1067438350"/>
+      </p:ext>
+    </p:extLst>
+  </p:cSld>
+  <p:clrMapOvr>
+    <a:masterClrMapping/>
+  </p:clrMapOvr>
+</p:sld>
+</file>
+
+<file path=ppt/slides/slide5.xml><?xml version="1.0" encoding="utf-8"?>
+<p:sld xmlns:a="http://schemas.openxmlformats.org/drawingml/2006/main" xmlns:r="http://schemas.openxmlformats.org/officeDocument/2006/relationships" xmlns:p="http://schemas.openxmlformats.org/presentationml/2006/main">
+  <p:cSld>
+    <p:spTree>
+      <p:nvGrpSpPr>
+        <p:cNvPr id="1" name=""/>
+        <p:cNvGrpSpPr/>
+        <p:nvPr/>
+      </p:nvGrpSpPr>
+      <p:grpSpPr>
+        <a:xfrm>
+          <a:off x="0" y="0"/>
+          <a:ext cx="0" cy="0"/>
+          <a:chOff x="0" y="0"/>
+          <a:chExt cx="0" cy="0"/>
+        </a:xfrm>
+      </p:grpSpPr>
+      <p:sp>
+        <p:nvSpPr>
+          <p:cNvPr id="3" name="Text Placeholder 2">
+            <a:extLst>
+              <a:ext uri="{FF2B5EF4-FFF2-40B4-BE49-F238E27FC236}">
+                <a16:creationId xmlns:a16="http://schemas.microsoft.com/office/drawing/2014/main" id="{6E3909CC-9819-6445-A908-8CD6E18821C6}"/>
+              </a:ext>
+            </a:extLst>
+          </p:cNvPr>
+          <p:cNvSpPr>
+            <a:spLocks noGrp="1"/>
+          </p:cNvSpPr>
+          <p:nvPr>
+            <p:ph type="body" sz="quarter" idx="14"/>
+          </p:nvPr>
+        </p:nvSpPr>
+        <p:spPr>
+          <a:xfrm>
+            <a:off x="954303" y="1193058"/>
+            <a:ext cx="10363054" cy="4306594"/>
+          </a:xfrm>
+        </p:spPr>
+        <p:txBody>
+          <a:bodyPr>
+            <a:normAutofit lnSpcReduction="10000"/>
+          </a:bodyPr>
+          <a:lstStyle/>
+          <a:p>
+            <a:pPr marL="457200" indent="-457200">
+              <a:buFont typeface="Arial" panose="020B0604020202020204" pitchFamily="34" charset="0"/>
+              <a:buChar char="•"/>
+            </a:pPr>
+            <a:endParaRPr lang="en-US" dirty="0"/>
+          </a:p>
+          <a:p>
+            <a:pPr marL="457200" indent="-457200">
+              <a:buFont typeface="Arial" panose="020B0604020202020204" pitchFamily="34" charset="0"/>
+              <a:buChar char="•"/>
+            </a:pPr>
+            <a:r>
+              <a:rPr lang="en-US" dirty="0"/>
+              <a:t>In our daily practice, there is usually small things that block us</a:t>
+            </a:r>
+          </a:p>
+          <a:p>
+            <a:pPr marL="457200" indent="-457200">
+              <a:buFont typeface="Arial" panose="020B0604020202020204" pitchFamily="34" charset="0"/>
+              <a:buChar char="•"/>
+            </a:pPr>
+            <a:r>
+              <a:rPr lang="en-US" dirty="0"/>
+              <a:t>Consider noting these down on card or post-its</a:t>
+            </a:r>
+          </a:p>
+          <a:p>
+            <a:pPr marL="457200" indent="-457200">
+              <a:buFont typeface="Arial" panose="020B0604020202020204" pitchFamily="34" charset="0"/>
+              <a:buChar char="•"/>
+            </a:pPr>
+            <a:r>
+              <a:rPr lang="en-US" dirty="0"/>
+              <a:t>As other people encounter the same or similar issues, they can add it to the pile</a:t>
+            </a:r>
+          </a:p>
+          <a:p>
+            <a:pPr marL="457200" indent="-457200">
+              <a:buFont typeface="Arial" panose="020B0604020202020204" pitchFamily="34" charset="0"/>
+              <a:buChar char="•"/>
+            </a:pPr>
+            <a:r>
+              <a:rPr lang="en-US" dirty="0"/>
+              <a:t>This way the team can quickly see what are the major pain points in the project</a:t>
+            </a:r>
+          </a:p>
+          <a:p>
+            <a:pPr marL="457200" indent="-457200">
+              <a:buFont typeface="Arial" panose="020B0604020202020204" pitchFamily="34" charset="0"/>
+              <a:buChar char="•"/>
+            </a:pPr>
+            <a:r>
+              <a:rPr lang="en-US" dirty="0"/>
+              <a:t>During the next planning session you can bring these to the team and try to unblock</a:t>
+            </a:r>
+          </a:p>
+        </p:txBody>
+      </p:sp>
+      <p:sp>
+        <p:nvSpPr>
+          <p:cNvPr id="4" name="Text Placeholder 3">
+            <a:extLst>
+              <a:ext uri="{FF2B5EF4-FFF2-40B4-BE49-F238E27FC236}">
+                <a16:creationId xmlns:a16="http://schemas.microsoft.com/office/drawing/2014/main" id="{D1E798D3-E27F-F349-ADFD-6A2DD1E30093}"/>
+              </a:ext>
+            </a:extLst>
+          </p:cNvPr>
+          <p:cNvSpPr>
+            <a:spLocks noGrp="1"/>
+          </p:cNvSpPr>
+          <p:nvPr>
+            <p:ph type="body" sz="quarter" idx="16"/>
+          </p:nvPr>
+        </p:nvSpPr>
+        <p:spPr>
+          <a:xfrm>
+            <a:off x="954303" y="362445"/>
+            <a:ext cx="8038996" cy="631961"/>
+          </a:xfrm>
+        </p:spPr>
+        <p:txBody>
+          <a:bodyPr/>
+          <a:lstStyle/>
+          <a:p>
+            <a:r>
+              <a:rPr lang="en-US" dirty="0"/>
+              <a:t>Wall of pain</a:t>
+            </a:r>
+          </a:p>
+        </p:txBody>
+      </p:sp>
+    </p:spTree>
+    <p:extLst>
+      <p:ext uri="{BB962C8B-B14F-4D97-AF65-F5344CB8AC3E}">
+        <p14:creationId xmlns:p14="http://schemas.microsoft.com/office/powerpoint/2010/main" val="3772458392"/>
+      </p:ext>
+    </p:extLst>
+  </p:cSld>
+  <p:clrMapOvr>
+    <a:masterClrMapping/>
+  </p:clrMapOvr>
+</p:sld>
+</file>
+
+<file path=ppt/slides/slide6.xml><?xml version="1.0" encoding="utf-8"?>
+<p:sld xmlns:a="http://schemas.openxmlformats.org/drawingml/2006/main" xmlns:r="http://schemas.openxmlformats.org/officeDocument/2006/relationships" xmlns:p="http://schemas.openxmlformats.org/presentationml/2006/main">
+  <p:cSld>
+    <p:bg>
+      <p:bgPr>
+        <a:solidFill>
+          <a:schemeClr val="tx1"/>
+        </a:solidFill>
+        <a:effectLst/>
+      </p:bgPr>
+    </p:bg>
+    <p:spTree>
+      <p:nvGrpSpPr>
+        <p:cNvPr id="1" name=""/>
+        <p:cNvGrpSpPr/>
+        <p:nvPr/>
+      </p:nvGrpSpPr>
+      <p:grpSpPr>
+        <a:xfrm>
+          <a:off x="0" y="0"/>
+          <a:ext cx="0" cy="0"/>
+          <a:chOff x="0" y="0"/>
+          <a:chExt cx="0" cy="0"/>
+        </a:xfrm>
+      </p:grpSpPr>
+      <p:sp>
+        <p:nvSpPr>
+          <p:cNvPr id="7" name="Content Placeholder 1"/>
+          <p:cNvSpPr txBox="1">
+            <a:spLocks/>
+          </p:cNvSpPr>
+          <p:nvPr/>
+        </p:nvSpPr>
+        <p:spPr>
+          <a:xfrm>
+            <a:off x="5286116" y="2016777"/>
+            <a:ext cx="6369426" cy="1412223"/>
+          </a:xfrm>
+          <a:prstGeom prst="rect">
+            <a:avLst/>
+          </a:prstGeom>
+        </p:spPr>
+        <p:txBody>
+          <a:bodyPr/>
+          <a:lstStyle>
+            <a:lvl1pPr marL="228600" indent="-228600" algn="l" defTabSz="914400" rtl="0" eaLnBrk="1" latinLnBrk="0" hangingPunct="1">
+              <a:lnSpc>
+                <a:spcPct val="90000"/>
+              </a:lnSpc>
+              <a:spcBef>
+                <a:spcPts val="1000"/>
+              </a:spcBef>
+              <a:buFont typeface="Arial" panose="020B0604020202020204" pitchFamily="34" charset="0"/>
+              <a:buChar char="•"/>
+              <a:defRPr sz="2800" kern="1200">
+                <a:solidFill>
+                  <a:schemeClr val="tx1"/>
+                </a:solidFill>
+                <a:latin typeface="+mn-lt"/>
+                <a:ea typeface="+mn-ea"/>
+                <a:cs typeface="+mn-cs"/>
+              </a:defRPr>
+            </a:lvl1pPr>
+            <a:lvl2pPr marL="685800" indent="-228600" algn="l" defTabSz="914400" rtl="0" eaLnBrk="1" latinLnBrk="0" hangingPunct="1">
+              <a:lnSpc>
+                <a:spcPct val="90000"/>
+              </a:lnSpc>
+              <a:spcBef>
+                <a:spcPts val="500"/>
+              </a:spcBef>
+              <a:buFont typeface="Arial" panose="020B0604020202020204" pitchFamily="34" charset="0"/>
+              <a:buChar char="•"/>
+              <a:defRPr sz="2400" kern="1200">
+                <a:solidFill>
+                  <a:schemeClr val="tx1"/>
+                </a:solidFill>
+                <a:latin typeface="+mn-lt"/>
+                <a:ea typeface="+mn-ea"/>
+                <a:cs typeface="+mn-cs"/>
+              </a:defRPr>
+            </a:lvl2pPr>
+            <a:lvl3pPr marL="1143000" indent="-228600" algn="l" defTabSz="914400" rtl="0" eaLnBrk="1" latinLnBrk="0" hangingPunct="1">
+              <a:lnSpc>
+                <a:spcPct val="90000"/>
+              </a:lnSpc>
+              <a:spcBef>
+                <a:spcPts val="500"/>
+              </a:spcBef>
+              <a:buFont typeface="Arial" panose="020B0604020202020204" pitchFamily="34" charset="0"/>
+              <a:buChar char="•"/>
+              <a:defRPr sz="2000" kern="1200">
+                <a:solidFill>
+                  <a:schemeClr val="tx1"/>
+                </a:solidFill>
+                <a:latin typeface="+mn-lt"/>
+                <a:ea typeface="+mn-ea"/>
+                <a:cs typeface="+mn-cs"/>
+              </a:defRPr>
+            </a:lvl3pPr>
+            <a:lvl4pPr marL="1600200" indent="-228600" algn="l" defTabSz="914400" rtl="0" eaLnBrk="1" latinLnBrk="0" hangingPunct="1">
+              <a:lnSpc>
+                <a:spcPct val="90000"/>
+              </a:lnSpc>
+              <a:spcBef>
+                <a:spcPts val="500"/>
+              </a:spcBef>
+              <a:buFont typeface="Arial" panose="020B0604020202020204" pitchFamily="34" charset="0"/>
+              <a:buChar char="•"/>
+              <a:defRPr sz="1800" kern="1200">
+                <a:solidFill>
+                  <a:schemeClr val="tx1"/>
+                </a:solidFill>
+                <a:latin typeface="+mn-lt"/>
+                <a:ea typeface="+mn-ea"/>
+                <a:cs typeface="+mn-cs"/>
+              </a:defRPr>
+            </a:lvl4pPr>
+            <a:lvl5pPr marL="2057400" indent="-228600" algn="l" defTabSz="914400" rtl="0" eaLnBrk="1" latinLnBrk="0" hangingPunct="1">
+              <a:lnSpc>
+                <a:spcPct val="90000"/>
+              </a:lnSpc>
+              <a:spcBef>
+                <a:spcPts val="500"/>
+              </a:spcBef>
+              <a:buFont typeface="Arial" panose="020B0604020202020204" pitchFamily="34" charset="0"/>
+              <a:buChar char="•"/>
+              <a:defRPr sz="1800" kern="1200">
+                <a:solidFill>
+                  <a:schemeClr val="tx1"/>
+                </a:solidFill>
+                <a:latin typeface="+mn-lt"/>
+                <a:ea typeface="+mn-ea"/>
+                <a:cs typeface="+mn-cs"/>
+              </a:defRPr>
+            </a:lvl5pPr>
+            <a:lvl6pPr marL="2514600" indent="-228600" algn="l" defTabSz="914400" rtl="0" eaLnBrk="1" latinLnBrk="0" hangingPunct="1">
+              <a:lnSpc>
+                <a:spcPct val="90000"/>
+              </a:lnSpc>
+              <a:spcBef>
+                <a:spcPts val="500"/>
+              </a:spcBef>
+              <a:buFont typeface="Arial" panose="020B0604020202020204" pitchFamily="34" charset="0"/>
+              <a:buChar char="•"/>
+              <a:defRPr sz="1800" kern="1200">
+                <a:solidFill>
+                  <a:schemeClr val="tx1"/>
+                </a:solidFill>
+                <a:latin typeface="+mn-lt"/>
+                <a:ea typeface="+mn-ea"/>
+                <a:cs typeface="+mn-cs"/>
+              </a:defRPr>
+            </a:lvl6pPr>
+            <a:lvl7pPr marL="2971800" indent="-228600" algn="l" defTabSz="914400" rtl="0" eaLnBrk="1" latinLnBrk="0" hangingPunct="1">
+              <a:lnSpc>
+                <a:spcPct val="90000"/>
+              </a:lnSpc>
+              <a:spcBef>
+                <a:spcPts val="500"/>
+              </a:spcBef>
+              <a:buFont typeface="Arial" panose="020B0604020202020204" pitchFamily="34" charset="0"/>
+              <a:buChar char="•"/>
+              <a:defRPr sz="1800" kern="1200">
+                <a:solidFill>
+                  <a:schemeClr val="tx1"/>
+                </a:solidFill>
+                <a:latin typeface="+mn-lt"/>
+                <a:ea typeface="+mn-ea"/>
+                <a:cs typeface="+mn-cs"/>
+              </a:defRPr>
+            </a:lvl7pPr>
+            <a:lvl8pPr marL="3429000" indent="-228600" algn="l" defTabSz="914400" rtl="0" eaLnBrk="1" latinLnBrk="0" hangingPunct="1">
+              <a:lnSpc>
+                <a:spcPct val="90000"/>
+              </a:lnSpc>
+              <a:spcBef>
+                <a:spcPts val="500"/>
+              </a:spcBef>
+              <a:buFont typeface="Arial" panose="020B0604020202020204" pitchFamily="34" charset="0"/>
+              <a:buChar char="•"/>
+              <a:defRPr sz="1800" kern="1200">
+                <a:solidFill>
+                  <a:schemeClr val="tx1"/>
+                </a:solidFill>
+                <a:latin typeface="+mn-lt"/>
+                <a:ea typeface="+mn-ea"/>
+                <a:cs typeface="+mn-cs"/>
+              </a:defRPr>
+            </a:lvl8pPr>
+            <a:lvl9pPr marL="3886200" indent="-228600" algn="l" defTabSz="914400" rtl="0" eaLnBrk="1" latinLnBrk="0" hangingPunct="1">
+              <a:lnSpc>
+                <a:spcPct val="90000"/>
+              </a:lnSpc>
+              <a:spcBef>
+                <a:spcPts val="500"/>
+              </a:spcBef>
+              <a:buFont typeface="Arial" panose="020B0604020202020204" pitchFamily="34" charset="0"/>
+              <a:buChar char="•"/>
+              <a:defRPr sz="1800" kern="1200">
+                <a:solidFill>
+                  <a:schemeClr val="tx1"/>
+                </a:solidFill>
+                <a:latin typeface="+mn-lt"/>
+                <a:ea typeface="+mn-ea"/>
+                <a:cs typeface="+mn-cs"/>
+              </a:defRPr>
+            </a:lvl9pPr>
+          </a:lstStyle>
+          <a:p>
+            <a:pPr marL="0" indent="0">
+              <a:buNone/>
+            </a:pPr>
+            <a:r>
+              <a:rPr lang="en-US" dirty="0">
+                <a:solidFill>
+                  <a:schemeClr val="bg1"/>
+                </a:solidFill>
+              </a:rPr>
+              <a:t> </a:t>
+            </a:r>
+          </a:p>
+        </p:txBody>
+      </p:sp>
+      <p:sp>
+        <p:nvSpPr>
+          <p:cNvPr id="8" name="TextBox 7">
+            <a:extLst>
+              <a:ext uri="{FF2B5EF4-FFF2-40B4-BE49-F238E27FC236}">
+                <a16:creationId xmlns:a16="http://schemas.microsoft.com/office/drawing/2014/main" id="{6A5E0042-AC0D-4B3C-8E70-B3DD558EA421}"/>
+              </a:ext>
+            </a:extLst>
+          </p:cNvPr>
+          <p:cNvSpPr txBox="1"/>
+          <p:nvPr/>
+        </p:nvSpPr>
+        <p:spPr>
+          <a:xfrm>
+            <a:off x="1377680" y="2676135"/>
+            <a:ext cx="9741439" cy="1277273"/>
+          </a:xfrm>
+          <a:prstGeom prst="rect">
+            <a:avLst/>
+          </a:prstGeom>
+          <a:noFill/>
+        </p:spPr>
+        <p:txBody>
+          <a:bodyPr wrap="square" rtlCol="0">
+            <a:spAutoFit/>
+          </a:bodyPr>
+          <a:lstStyle/>
+          <a:p>
+            <a:r>
+              <a:rPr lang="en-US" sz="7700" dirty="0" err="1">
+                <a:solidFill>
+                  <a:schemeClr val="bg1"/>
+                </a:solidFill>
+              </a:rPr>
+              <a:t>Priortisation</a:t>
+            </a:r>
+            <a:endParaRPr lang="en-US" sz="6000" dirty="0">
+              <a:solidFill>
+                <a:schemeClr val="bg1"/>
+              </a:solidFill>
+            </a:endParaRPr>
+          </a:p>
+        </p:txBody>
+      </p:sp>
+      <p:sp>
+        <p:nvSpPr>
+          <p:cNvPr id="3" name="AutoShape 2" descr="https://falmouthac.sharepoint.com/teams/games/GameDev/Image%20Bank/2017%2001%2017%20Programmers%20Guild%20Workshop/WP_20170117_11_55_41_Pro.jpg">
+            <a:extLst>
+              <a:ext uri="{FF2B5EF4-FFF2-40B4-BE49-F238E27FC236}">
+                <a16:creationId xmlns:a16="http://schemas.microsoft.com/office/drawing/2014/main" id="{7F32BB6C-44F2-4A5C-81D5-45F5683591FD}"/>
+              </a:ext>
+            </a:extLst>
+          </p:cNvPr>
+          <p:cNvSpPr>
+            <a:spLocks noChangeAspect="1" noChangeArrowheads="1"/>
+          </p:cNvSpPr>
+          <p:nvPr/>
+        </p:nvSpPr>
+        <p:spPr bwMode="auto">
+          <a:xfrm>
+            <a:off x="5943600" y="3276600"/>
+            <a:ext cx="304800" cy="304800"/>
+          </a:xfrm>
+          <a:prstGeom prst="rect">
+            <a:avLst/>
+          </a:prstGeom>
+          <a:noFill/>
+          <a:extLst>
+            <a:ext uri="{909E8E84-426E-40DD-AFC4-6F175D3DCCD1}">
+              <a14:hiddenFill xmlns:a14="http://schemas.microsoft.com/office/drawing/2010/main">
+                <a:solidFill>
+                  <a:srgbClr val="FFFFFF"/>
+                </a:solidFill>
+              </a14:hiddenFill>
+            </a:ext>
+          </a:extLst>
+        </p:spPr>
+        <p:txBody>
+          <a:bodyPr vert="horz" wrap="square" lIns="91440" tIns="45720" rIns="91440" bIns="45720" numCol="1" anchor="t" anchorCtr="0" compatLnSpc="1">
+            <a:prstTxWarp prst="textNoShape">
+              <a:avLst/>
+            </a:prstTxWarp>
+          </a:bodyPr>
+          <a:lstStyle/>
+          <a:p>
+            <a:endParaRPr lang="en-GB"/>
+          </a:p>
+        </p:txBody>
+      </p:sp>
+    </p:spTree>
+    <p:extLst>
+      <p:ext uri="{BB962C8B-B14F-4D97-AF65-F5344CB8AC3E}">
+        <p14:creationId xmlns:p14="http://schemas.microsoft.com/office/powerpoint/2010/main" val="3746771482"/>
+      </p:ext>
+    </p:extLst>
+  </p:cSld>
+  <p:clrMapOvr>
+    <a:masterClrMapping/>
+  </p:clrMapOvr>
+</p:sld>
+</file>
+
+<file path=ppt/slides/slide7.xml><?xml version="1.0" encoding="utf-8"?>
+<p:sld xmlns:a="http://schemas.openxmlformats.org/drawingml/2006/main" xmlns:r="http://schemas.openxmlformats.org/officeDocument/2006/relationships" xmlns:p="http://schemas.openxmlformats.org/presentationml/2006/main">
+  <p:cSld>
+    <p:spTree>
+      <p:nvGrpSpPr>
+        <p:cNvPr id="1" name=""/>
+        <p:cNvGrpSpPr/>
+        <p:nvPr/>
+      </p:nvGrpSpPr>
+      <p:grpSpPr>
+        <a:xfrm>
+          <a:off x="0" y="0"/>
+          <a:ext cx="0" cy="0"/>
+          <a:chOff x="0" y="0"/>
+          <a:chExt cx="0" cy="0"/>
+        </a:xfrm>
+      </p:grpSpPr>
+      <p:sp>
+        <p:nvSpPr>
+          <p:cNvPr id="3" name="Text Placeholder 2">
+            <a:extLst>
+              <a:ext uri="{FF2B5EF4-FFF2-40B4-BE49-F238E27FC236}">
+                <a16:creationId xmlns:a16="http://schemas.microsoft.com/office/drawing/2014/main" id="{6E3909CC-9819-6445-A908-8CD6E18821C6}"/>
+              </a:ext>
+            </a:extLst>
+          </p:cNvPr>
+          <p:cNvSpPr>
+            <a:spLocks noGrp="1"/>
+          </p:cNvSpPr>
+          <p:nvPr>
+            <p:ph type="body" sz="quarter" idx="14"/>
+          </p:nvPr>
+        </p:nvSpPr>
+        <p:spPr>
+          <a:xfrm>
+            <a:off x="954303" y="1193058"/>
+            <a:ext cx="10363054" cy="4306594"/>
+          </a:xfrm>
+        </p:spPr>
+        <p:txBody>
+          <a:bodyPr>
+            <a:normAutofit fontScale="92500"/>
+          </a:bodyPr>
+          <a:lstStyle/>
+          <a:p>
+            <a:pPr marL="457200" indent="-457200">
+              <a:buFont typeface="Arial" panose="020B0604020202020204" pitchFamily="34" charset="0"/>
+              <a:buChar char="•"/>
+            </a:pPr>
+            <a:r>
+              <a:rPr lang="en-US" dirty="0"/>
+              <a:t>This is a collaborative effort to ordering a set of Backlog Items</a:t>
+            </a:r>
+          </a:p>
+          <a:p>
+            <a:pPr marL="457200" indent="-457200">
+              <a:buFont typeface="Arial" panose="020B0604020202020204" pitchFamily="34" charset="0"/>
+              <a:buChar char="•"/>
+            </a:pPr>
+            <a:r>
+              <a:rPr lang="en-US" dirty="0"/>
+              <a:t>First sort all your items into a deck</a:t>
+            </a:r>
+          </a:p>
+          <a:p>
+            <a:pPr marL="457200" indent="-457200">
+              <a:buFont typeface="Arial" panose="020B0604020202020204" pitchFamily="34" charset="0"/>
+              <a:buChar char="•"/>
+            </a:pPr>
+            <a:r>
+              <a:rPr lang="en-US" dirty="0"/>
+              <a:t>You then draw an item from the deck and place it in the middle</a:t>
+            </a:r>
+          </a:p>
+          <a:p>
+            <a:pPr marL="457200" indent="-457200">
+              <a:buFont typeface="Arial" panose="020B0604020202020204" pitchFamily="34" charset="0"/>
+              <a:buChar char="•"/>
+            </a:pPr>
+            <a:r>
+              <a:rPr lang="en-US" dirty="0"/>
+              <a:t>Each team member draws a card, and places it above/Below or alongside</a:t>
+            </a:r>
+          </a:p>
+          <a:p>
+            <a:pPr marL="457200" indent="-457200">
+              <a:buFont typeface="Arial" panose="020B0604020202020204" pitchFamily="34" charset="0"/>
+              <a:buChar char="•"/>
+            </a:pPr>
+            <a:r>
+              <a:rPr lang="en-US" dirty="0"/>
+              <a:t>This is based on the perceived priority of the item</a:t>
+            </a:r>
+          </a:p>
+          <a:p>
+            <a:pPr marL="457200" indent="-457200">
+              <a:buFont typeface="Arial" panose="020B0604020202020204" pitchFamily="34" charset="0"/>
+              <a:buChar char="•"/>
+            </a:pPr>
+            <a:r>
+              <a:rPr lang="en-US" dirty="0"/>
+              <a:t>Instead of placing a card, a team member can swap two cards</a:t>
+            </a:r>
+          </a:p>
+          <a:p>
+            <a:pPr marL="457200" indent="-457200">
+              <a:buFont typeface="Arial" panose="020B0604020202020204" pitchFamily="34" charset="0"/>
+              <a:buChar char="•"/>
+            </a:pPr>
+            <a:r>
+              <a:rPr lang="en-US" dirty="0"/>
+              <a:t>This continues until the deck is empty</a:t>
+            </a:r>
+          </a:p>
+          <a:p>
+            <a:pPr marL="457200" indent="-457200">
+              <a:buFont typeface="Arial" panose="020B0604020202020204" pitchFamily="34" charset="0"/>
+              <a:buChar char="•"/>
+            </a:pPr>
+            <a:endParaRPr lang="en-US" dirty="0"/>
+          </a:p>
+          <a:p>
+            <a:pPr marL="457200" indent="-457200">
+              <a:buFont typeface="Arial" panose="020B0604020202020204" pitchFamily="34" charset="0"/>
+              <a:buChar char="•"/>
+            </a:pPr>
+            <a:endParaRPr lang="en-US" dirty="0"/>
+          </a:p>
+        </p:txBody>
+      </p:sp>
+      <p:sp>
+        <p:nvSpPr>
+          <p:cNvPr id="4" name="Text Placeholder 3">
+            <a:extLst>
+              <a:ext uri="{FF2B5EF4-FFF2-40B4-BE49-F238E27FC236}">
+                <a16:creationId xmlns:a16="http://schemas.microsoft.com/office/drawing/2014/main" id="{D1E798D3-E27F-F349-ADFD-6A2DD1E30093}"/>
+              </a:ext>
+            </a:extLst>
+          </p:cNvPr>
+          <p:cNvSpPr>
+            <a:spLocks noGrp="1"/>
+          </p:cNvSpPr>
+          <p:nvPr>
+            <p:ph type="body" sz="quarter" idx="16"/>
+          </p:nvPr>
+        </p:nvSpPr>
+        <p:spPr>
+          <a:xfrm>
+            <a:off x="954303" y="362445"/>
+            <a:ext cx="8038996" cy="631961"/>
+          </a:xfrm>
+        </p:spPr>
+        <p:txBody>
+          <a:bodyPr/>
+          <a:lstStyle/>
+          <a:p>
+            <a:r>
+              <a:rPr lang="en-US" dirty="0"/>
+              <a:t>Rank Orderings </a:t>
+            </a:r>
+          </a:p>
+        </p:txBody>
+      </p:sp>
+    </p:spTree>
+    <p:extLst>
+      <p:ext uri="{BB962C8B-B14F-4D97-AF65-F5344CB8AC3E}">
+        <p14:creationId xmlns:p14="http://schemas.microsoft.com/office/powerpoint/2010/main" val="2043178498"/>
+      </p:ext>
+    </p:extLst>
+  </p:cSld>
+  <p:clrMapOvr>
+    <a:masterClrMapping/>
+  </p:clrMapOvr>
+</p:sld>
+</file>
+
+<file path=ppt/slides/slide8.xml><?xml version="1.0" encoding="utf-8"?>
+<p:sld xmlns:a="http://schemas.openxmlformats.org/drawingml/2006/main" xmlns:r="http://schemas.openxmlformats.org/officeDocument/2006/relationships" xmlns:p="http://schemas.openxmlformats.org/presentationml/2006/main">
+  <p:cSld>
+    <p:spTree>
+      <p:nvGrpSpPr>
+        <p:cNvPr id="1" name=""/>
+        <p:cNvGrpSpPr/>
+        <p:nvPr/>
+      </p:nvGrpSpPr>
+      <p:grpSpPr>
+        <a:xfrm>
+          <a:off x="0" y="0"/>
+          <a:ext cx="0" cy="0"/>
+          <a:chOff x="0" y="0"/>
+          <a:chExt cx="0" cy="0"/>
+        </a:xfrm>
+      </p:grpSpPr>
+      <p:sp>
+        <p:nvSpPr>
+          <p:cNvPr id="4" name="Text Placeholder 3">
+            <a:extLst>
+              <a:ext uri="{FF2B5EF4-FFF2-40B4-BE49-F238E27FC236}">
+                <a16:creationId xmlns:a16="http://schemas.microsoft.com/office/drawing/2014/main" id="{D1E798D3-E27F-F349-ADFD-6A2DD1E30093}"/>
+              </a:ext>
+            </a:extLst>
+          </p:cNvPr>
+          <p:cNvSpPr>
+            <a:spLocks noGrp="1"/>
+          </p:cNvSpPr>
+          <p:nvPr>
+            <p:ph type="body" sz="quarter" idx="16"/>
+          </p:nvPr>
+        </p:nvSpPr>
+        <p:spPr>
+          <a:xfrm>
+            <a:off x="954303" y="362445"/>
+            <a:ext cx="8038996" cy="631961"/>
+          </a:xfrm>
+        </p:spPr>
+        <p:txBody>
+          <a:bodyPr/>
+          <a:lstStyle/>
+          <a:p>
+            <a:r>
+              <a:rPr lang="en-US" dirty="0"/>
+              <a:t>Rank Orderings </a:t>
+            </a:r>
+          </a:p>
+        </p:txBody>
+      </p:sp>
+      <p:sp>
+        <p:nvSpPr>
+          <p:cNvPr id="6" name="Rectangle 5">
+            <a:extLst>
+              <a:ext uri="{FF2B5EF4-FFF2-40B4-BE49-F238E27FC236}">
+                <a16:creationId xmlns:a16="http://schemas.microsoft.com/office/drawing/2014/main" id="{0F8D3538-E269-4C52-B976-F958976EB6BF}"/>
+              </a:ext>
+            </a:extLst>
+          </p:cNvPr>
+          <p:cNvSpPr/>
+          <p:nvPr/>
+        </p:nvSpPr>
+        <p:spPr>
+          <a:xfrm>
+            <a:off x="954303" y="1258349"/>
+            <a:ext cx="723495" cy="427838"/>
+          </a:xfrm>
+          <a:prstGeom prst="rect">
+            <a:avLst/>
+          </a:prstGeom>
+        </p:spPr>
+        <p:style>
+          <a:lnRef idx="2">
+            <a:schemeClr val="accent1">
+              <a:shade val="50000"/>
+            </a:schemeClr>
+          </a:lnRef>
+          <a:fillRef idx="1">
+            <a:schemeClr val="accent1"/>
+          </a:fillRef>
+          <a:effectRef idx="0">
+            <a:schemeClr val="accent1"/>
+          </a:effectRef>
+          <a:fontRef idx="minor">
+            <a:schemeClr val="lt1"/>
+          </a:fontRef>
+        </p:style>
+        <p:txBody>
+          <a:bodyPr rtlCol="0" anchor="ctr"/>
+          <a:lstStyle/>
+          <a:p>
+            <a:pPr algn="ctr"/>
+            <a:endParaRPr lang="en-GB"/>
+          </a:p>
+        </p:txBody>
+      </p:sp>
+    </p:spTree>
+    <p:extLst>
+      <p:ext uri="{BB962C8B-B14F-4D97-AF65-F5344CB8AC3E}">
+        <p14:creationId xmlns:p14="http://schemas.microsoft.com/office/powerpoint/2010/main" val="2312237478"/>
+      </p:ext>
+    </p:extLst>
+  </p:cSld>
+  <p:clrMapOvr>
+    <a:masterClrMapping/>
+  </p:clrMapOvr>
+</p:sld>
+</file>
+
+<file path=ppt/slides/slide9.xml><?xml version="1.0" encoding="utf-8"?>
+<p:sld xmlns:a="http://schemas.openxmlformats.org/drawingml/2006/main" xmlns:r="http://schemas.openxmlformats.org/officeDocument/2006/relationships" xmlns:p="http://schemas.openxmlformats.org/presentationml/2006/main">
+  <p:cSld>
+    <p:spTree>
+      <p:nvGrpSpPr>
+        <p:cNvPr id="1" name=""/>
+        <p:cNvGrpSpPr/>
+        <p:nvPr/>
+      </p:nvGrpSpPr>
+      <p:grpSpPr>
+        <a:xfrm>
+          <a:off x="0" y="0"/>
+          <a:ext cx="0" cy="0"/>
+          <a:chOff x="0" y="0"/>
+          <a:chExt cx="0" cy="0"/>
+        </a:xfrm>
+      </p:grpSpPr>
+      <p:sp>
+        <p:nvSpPr>
+          <p:cNvPr id="3" name="Text Placeholder 2">
+            <a:extLst>
+              <a:ext uri="{FF2B5EF4-FFF2-40B4-BE49-F238E27FC236}">
+                <a16:creationId xmlns:a16="http://schemas.microsoft.com/office/drawing/2014/main" id="{6E3909CC-9819-6445-A908-8CD6E18821C6}"/>
+              </a:ext>
+            </a:extLst>
+          </p:cNvPr>
+          <p:cNvSpPr>
+            <a:spLocks noGrp="1"/>
+          </p:cNvSpPr>
+          <p:nvPr>
+            <p:ph type="body" sz="quarter" idx="14"/>
+          </p:nvPr>
+        </p:nvSpPr>
+        <p:spPr>
+          <a:xfrm>
+            <a:off x="954303" y="1193058"/>
+            <a:ext cx="10363054" cy="4306594"/>
+          </a:xfrm>
+        </p:spPr>
+        <p:txBody>
+          <a:bodyPr>
+            <a:normAutofit lnSpcReduction="10000"/>
+          </a:bodyPr>
+          <a:lstStyle/>
+          <a:p>
+            <a:pPr marL="457200" indent="-457200">
+              <a:buFont typeface="Arial" panose="020B0604020202020204" pitchFamily="34" charset="0"/>
+              <a:buChar char="•"/>
+            </a:pPr>
+            <a:endParaRPr lang="en-US" dirty="0"/>
+          </a:p>
+          <a:p>
+            <a:pPr marL="457200" indent="-457200">
+              <a:buFont typeface="Arial" panose="020B0604020202020204" pitchFamily="34" charset="0"/>
+              <a:buChar char="•"/>
+            </a:pPr>
+            <a:r>
+              <a:rPr lang="en-US" dirty="0"/>
+              <a:t>Stands for:</a:t>
+            </a:r>
+          </a:p>
+          <a:p>
+            <a:pPr marL="1143000" lvl="1" indent="-457200"/>
+            <a:r>
+              <a:rPr lang="en-US" b="1" dirty="0"/>
+              <a:t>M</a:t>
+            </a:r>
+            <a:r>
+              <a:rPr lang="en-US" dirty="0"/>
+              <a:t>ust have – features we cannot ship without</a:t>
+            </a:r>
+          </a:p>
+          <a:p>
+            <a:pPr marL="1143000" lvl="1" indent="-457200"/>
+            <a:r>
+              <a:rPr lang="en-US" b="1" dirty="0"/>
+              <a:t>S</a:t>
+            </a:r>
+            <a:r>
+              <a:rPr lang="en-US" dirty="0"/>
+              <a:t>hould have – features that we can cut, but would have an impact on the game</a:t>
+            </a:r>
+          </a:p>
+          <a:p>
+            <a:pPr marL="1143000" lvl="1" indent="-457200"/>
+            <a:r>
+              <a:rPr lang="en-US" b="1" dirty="0"/>
+              <a:t>C</a:t>
+            </a:r>
+            <a:r>
+              <a:rPr lang="en-US" dirty="0"/>
+              <a:t>ould have – features that we can cut, but can cut without much impact on the game</a:t>
+            </a:r>
+          </a:p>
+          <a:p>
+            <a:pPr marL="1143000" lvl="1" indent="-457200"/>
+            <a:r>
+              <a:rPr lang="en-US" b="1" dirty="0"/>
+              <a:t>W</a:t>
+            </a:r>
+            <a:r>
+              <a:rPr lang="en-US" dirty="0"/>
+              <a:t>on’t have – features that we can cut, without any real impact on the game</a:t>
+            </a:r>
+          </a:p>
+          <a:p>
+            <a:pPr marL="457200" indent="-457200">
+              <a:buFont typeface="Arial" panose="020B0604020202020204" pitchFamily="34" charset="0"/>
+              <a:buChar char="•"/>
+            </a:pPr>
+            <a:r>
+              <a:rPr lang="en-US" dirty="0"/>
+              <a:t>Have the whole team go through the </a:t>
+            </a:r>
+            <a:r>
+              <a:rPr lang="en-US" dirty="0" err="1"/>
+              <a:t>blacklog</a:t>
+            </a:r>
+            <a:endParaRPr lang="en-US" dirty="0"/>
+          </a:p>
+          <a:p>
+            <a:pPr marL="457200" indent="-457200">
+              <a:buFont typeface="Arial" panose="020B0604020202020204" pitchFamily="34" charset="0"/>
+              <a:buChar char="•"/>
+            </a:pPr>
+            <a:r>
+              <a:rPr lang="en-US" dirty="0"/>
+              <a:t>Sort each backlog item into the above categories</a:t>
+            </a:r>
+          </a:p>
+          <a:p>
+            <a:pPr marL="457200" indent="-457200">
+              <a:buFont typeface="Arial" panose="020B0604020202020204" pitchFamily="34" charset="0"/>
+              <a:buChar char="•"/>
+            </a:pPr>
+            <a:endParaRPr lang="en-US" dirty="0"/>
+          </a:p>
+        </p:txBody>
+      </p:sp>
+      <p:sp>
+        <p:nvSpPr>
+          <p:cNvPr id="4" name="Text Placeholder 3">
+            <a:extLst>
+              <a:ext uri="{FF2B5EF4-FFF2-40B4-BE49-F238E27FC236}">
+                <a16:creationId xmlns:a16="http://schemas.microsoft.com/office/drawing/2014/main" id="{D1E798D3-E27F-F349-ADFD-6A2DD1E30093}"/>
+              </a:ext>
+            </a:extLst>
+          </p:cNvPr>
+          <p:cNvSpPr>
+            <a:spLocks noGrp="1"/>
+          </p:cNvSpPr>
+          <p:nvPr>
+            <p:ph type="body" sz="quarter" idx="16"/>
+          </p:nvPr>
+        </p:nvSpPr>
+        <p:spPr>
+          <a:xfrm>
+            <a:off x="954303" y="362445"/>
+            <a:ext cx="8038996" cy="631961"/>
+          </a:xfrm>
+        </p:spPr>
+        <p:txBody>
+          <a:bodyPr/>
+          <a:lstStyle/>
+          <a:p>
+            <a:r>
+              <a:rPr lang="en-US" b="1" dirty="0"/>
+              <a:t>M</a:t>
+            </a:r>
+            <a:r>
+              <a:rPr lang="en-US" dirty="0"/>
+              <a:t>O</a:t>
+            </a:r>
+            <a:r>
+              <a:rPr lang="en-US" b="1" dirty="0"/>
+              <a:t>SC</a:t>
+            </a:r>
+            <a:r>
+              <a:rPr lang="en-US" dirty="0"/>
+              <a:t>O</a:t>
+            </a:r>
+            <a:r>
+              <a:rPr lang="en-US" b="1" dirty="0"/>
+              <a:t>W</a:t>
+            </a:r>
+          </a:p>
+        </p:txBody>
+      </p:sp>
+    </p:spTree>
+    <p:extLst>
+      <p:ext uri="{BB962C8B-B14F-4D97-AF65-F5344CB8AC3E}">
+        <p14:creationId xmlns:p14="http://schemas.microsoft.com/office/powerpoint/2010/main" val="4290850386"/>
       </p:ext>
     </p:extLst>
   </p:cSld>

</xml_diff>